<commit_message>
CSS 및 GITHUB PAGE 내용 정리
</commit_message>
<xml_diff>
--- a/Day2/강의 정리.pptx
+++ b/Day2/강의 정리.pptx
@@ -8,13 +8,19 @@
     <p:sldId id="256" r:id="rId2"/>
     <p:sldId id="257" r:id="rId3"/>
     <p:sldId id="260" r:id="rId4"/>
-    <p:sldId id="258" r:id="rId5"/>
-    <p:sldId id="259" r:id="rId6"/>
-    <p:sldId id="267" r:id="rId7"/>
-    <p:sldId id="269" r:id="rId8"/>
-    <p:sldId id="261" r:id="rId9"/>
-    <p:sldId id="262" r:id="rId10"/>
-    <p:sldId id="265" r:id="rId11"/>
+    <p:sldId id="259" r:id="rId5"/>
+    <p:sldId id="267" r:id="rId6"/>
+    <p:sldId id="269" r:id="rId7"/>
+    <p:sldId id="261" r:id="rId8"/>
+    <p:sldId id="270" r:id="rId9"/>
+    <p:sldId id="275" r:id="rId10"/>
+    <p:sldId id="276" r:id="rId11"/>
+    <p:sldId id="277" r:id="rId12"/>
+    <p:sldId id="258" r:id="rId13"/>
+    <p:sldId id="271" r:id="rId14"/>
+    <p:sldId id="272" r:id="rId15"/>
+    <p:sldId id="273" r:id="rId16"/>
+    <p:sldId id="274" r:id="rId17"/>
   </p:sldIdLst>
   <p:sldSz cx="12192000" cy="6858000"/>
   <p:notesSz cx="6858000" cy="9144000"/>
@@ -3043,57 +3049,9 @@
           <a:chExt cx="0" cy="0"/>
         </a:xfrm>
       </p:grpSpPr>
-      <p:pic>
-        <p:nvPicPr>
-          <p:cNvPr id="3" name="그림 2"/>
-          <p:cNvPicPr>
-            <a:picLocks noChangeAspect="1"/>
-          </p:cNvPicPr>
-          <p:nvPr/>
-        </p:nvPicPr>
-        <p:blipFill>
-          <a:blip r:embed="rId2"/>
-          <a:stretch>
-            <a:fillRect/>
-          </a:stretch>
-        </p:blipFill>
-        <p:spPr>
-          <a:xfrm>
-            <a:off x="0" y="483326"/>
-            <a:ext cx="4362450" cy="1447800"/>
-          </a:xfrm>
-          <a:prstGeom prst="rect">
-            <a:avLst/>
-          </a:prstGeom>
-        </p:spPr>
-      </p:pic>
-      <p:pic>
-        <p:nvPicPr>
-          <p:cNvPr id="4" name="그림 3"/>
-          <p:cNvPicPr>
-            <a:picLocks noChangeAspect="1"/>
-          </p:cNvPicPr>
-          <p:nvPr/>
-        </p:nvPicPr>
-        <p:blipFill>
-          <a:blip r:embed="rId3"/>
-          <a:stretch>
-            <a:fillRect/>
-          </a:stretch>
-        </p:blipFill>
-        <p:spPr>
-          <a:xfrm>
-            <a:off x="0" y="2323858"/>
-            <a:ext cx="4362049" cy="929617"/>
-          </a:xfrm>
-          <a:prstGeom prst="rect">
-            <a:avLst/>
-          </a:prstGeom>
-        </p:spPr>
-      </p:pic>
-      <p:sp>
-        <p:nvSpPr>
-          <p:cNvPr id="5" name="모서리가 둥근 직사각형 4"/>
+      <p:sp>
+        <p:nvSpPr>
+          <p:cNvPr id="11" name="모서리가 둥근 직사각형 10"/>
           <p:cNvSpPr/>
           <p:nvPr/>
         </p:nvSpPr>
@@ -3144,7 +3102,7 @@
                   <a:sysClr val="windowText" lastClr="000000"/>
                 </a:solidFill>
               </a:rPr>
-              <a:t>Git </a:t>
+              <a:t>GITHUB</a:t>
             </a:r>
             <a:r>
               <a:rPr lang="ko-KR" altLang="en-US" smtClean="0">
@@ -3152,7 +3110,7 @@
                   <a:sysClr val="windowText" lastClr="000000"/>
                 </a:solidFill>
               </a:rPr>
-              <a:t>자주 사용하는 명령어 </a:t>
+              <a:t>에서</a:t>
             </a:r>
             <a:r>
               <a:rPr lang="en-US" altLang="ko-KR" smtClean="0">
@@ -3160,7 +3118,39 @@
                   <a:sysClr val="windowText" lastClr="000000"/>
                 </a:solidFill>
               </a:rPr>
-              <a:t>– commit, log, status</a:t>
+              <a:t> </a:t>
+            </a:r>
+            <a:r>
+              <a:rPr lang="ko-KR" altLang="en-US" smtClean="0">
+                <a:solidFill>
+                  <a:sysClr val="windowText" lastClr="000000"/>
+                </a:solidFill>
+              </a:rPr>
+              <a:t>내 </a:t>
+            </a:r>
+            <a:r>
+              <a:rPr lang="en-US" altLang="ko-KR" smtClean="0">
+                <a:solidFill>
+                  <a:sysClr val="windowText" lastClr="000000"/>
+                </a:solidFill>
+              </a:rPr>
+              <a:t>PAGE </a:t>
+            </a:r>
+            <a:r>
+              <a:rPr lang="ko-KR" altLang="en-US" smtClean="0">
+                <a:solidFill>
+                  <a:sysClr val="windowText" lastClr="000000"/>
+                </a:solidFill>
+              </a:rPr>
+              <a:t>만들기</a:t>
+            </a:r>
+            <a:r>
+              <a:rPr lang="en-US" altLang="ko-KR" smtClean="0">
+                <a:solidFill>
+                  <a:sysClr val="windowText" lastClr="000000"/>
+                </a:solidFill>
+              </a:rPr>
+              <a:t> </a:t>
             </a:r>
             <a:endParaRPr lang="ko-KR" altLang="en-US">
               <a:solidFill>
@@ -3170,16 +3160,40 @@
           </a:p>
         </p:txBody>
       </p:sp>
-      <p:sp>
-        <p:nvSpPr>
-          <p:cNvPr id="7" name="TextBox 6"/>
+      <p:pic>
+        <p:nvPicPr>
+          <p:cNvPr id="2" name="그림 1"/>
+          <p:cNvPicPr>
+            <a:picLocks noChangeAspect="1"/>
+          </p:cNvPicPr>
+          <p:nvPr/>
+        </p:nvPicPr>
+        <p:blipFill>
+          <a:blip r:embed="rId2"/>
+          <a:stretch>
+            <a:fillRect/>
+          </a:stretch>
+        </p:blipFill>
+        <p:spPr>
+          <a:xfrm>
+            <a:off x="0" y="1400174"/>
+            <a:ext cx="6337527" cy="4029075"/>
+          </a:xfrm>
+          <a:prstGeom prst="rect">
+            <a:avLst/>
+          </a:prstGeom>
+        </p:spPr>
+      </p:pic>
+      <p:sp>
+        <p:nvSpPr>
+          <p:cNvPr id="3" name="TextBox 2"/>
           <p:cNvSpPr txBox="1"/>
           <p:nvPr/>
         </p:nvSpPr>
         <p:spPr>
           <a:xfrm>
-            <a:off x="5730681" y="497922"/>
-            <a:ext cx="6116414" cy="1569660"/>
+            <a:off x="573202" y="1061620"/>
+            <a:ext cx="5191125" cy="338554"/>
           </a:xfrm>
           <a:prstGeom prst="rect">
             <a:avLst/>
@@ -3192,115 +3206,338 @@
           </a:bodyPr>
           <a:lstStyle/>
           <a:p>
-            <a:r>
-              <a:rPr lang="en-US" altLang="ko-KR" sz="1600" smtClean="0"/>
-              <a:t>git branch –m </a:t>
-            </a:r>
-            <a:r>
-              <a:rPr lang="ko-KR" altLang="en-US" sz="1600" smtClean="0"/>
-              <a:t>명령어로 </a:t>
-            </a:r>
-            <a:r>
-              <a:rPr lang="en-US" altLang="ko-KR" sz="1600" smtClean="0"/>
-              <a:t>master branch </a:t>
-            </a:r>
-            <a:r>
-              <a:rPr lang="ko-KR" altLang="en-US" sz="1600" smtClean="0"/>
-              <a:t>이름을 </a:t>
-            </a:r>
-            <a:r>
-              <a:rPr lang="en-US" altLang="ko-KR" sz="1600" smtClean="0"/>
-              <a:t>main</a:t>
-            </a:r>
-            <a:r>
-              <a:rPr lang="ko-KR" altLang="en-US" sz="1600" smtClean="0"/>
-              <a:t>으로 변경</a:t>
-            </a:r>
-            <a:endParaRPr lang="en-US" altLang="ko-KR" sz="1600" smtClean="0"/>
-          </a:p>
-          <a:p>
-            <a:endParaRPr lang="en-US" altLang="ko-KR" sz="1600"/>
-          </a:p>
-          <a:p>
-            <a:r>
-              <a:rPr lang="en-US" altLang="ko-KR" sz="1600" smtClean="0"/>
-              <a:t>remote add origin </a:t>
-            </a:r>
-            <a:r>
-              <a:rPr lang="ko-KR" altLang="en-US" sz="1600" smtClean="0"/>
-              <a:t>명령어로 </a:t>
-            </a:r>
-            <a:r>
-              <a:rPr lang="en-US" altLang="ko-KR" sz="1600" smtClean="0"/>
-              <a:t>github </a:t>
-            </a:r>
-            <a:r>
-              <a:rPr lang="ko-KR" altLang="en-US" sz="1600" smtClean="0"/>
-              <a:t>저장소와 연결해준다</a:t>
-            </a:r>
-            <a:r>
-              <a:rPr lang="en-US" altLang="ko-KR" sz="1600" smtClean="0"/>
+            <a:pPr algn="ctr"/>
+            <a:r>
+              <a:rPr lang="ko-KR" altLang="en-US" sz="1600" b="1" smtClean="0"/>
+              <a:t>적용되기까지 시간이 조금 걸린다</a:t>
+            </a:r>
+            <a:r>
+              <a:rPr lang="en-US" altLang="ko-KR" sz="1600" b="1" smtClean="0"/>
               <a:t>.</a:t>
             </a:r>
-          </a:p>
-          <a:p>
-            <a:endParaRPr lang="en-US" altLang="ko-KR" sz="1600"/>
-          </a:p>
-          <a:p>
-            <a:r>
-              <a:rPr lang="en-US" altLang="ko-KR" sz="1600" smtClean="0"/>
-              <a:t>git push –u origin main</a:t>
-            </a:r>
-            <a:r>
-              <a:rPr lang="ko-KR" altLang="en-US" sz="1600"/>
-              <a:t> </a:t>
-            </a:r>
-            <a:r>
-              <a:rPr lang="ko-KR" altLang="en-US" sz="1600" smtClean="0"/>
-              <a:t>명령어로</a:t>
-            </a:r>
-            <a:r>
-              <a:rPr lang="en-US" altLang="ko-KR" sz="1600" smtClean="0"/>
-              <a:t>, </a:t>
-            </a:r>
-            <a:r>
-              <a:rPr lang="ko-KR" altLang="en-US" sz="1600" smtClean="0"/>
-              <a:t>현재 </a:t>
-            </a:r>
-            <a:r>
-              <a:rPr lang="en-US" altLang="ko-KR" sz="1600" smtClean="0"/>
-              <a:t>WEB </a:t>
-            </a:r>
-            <a:r>
-              <a:rPr lang="ko-KR" altLang="en-US" sz="1600" smtClean="0"/>
-              <a:t>안의 내용들을 </a:t>
-            </a:r>
-            <a:r>
-              <a:rPr lang="en-US" altLang="ko-KR" sz="1600" smtClean="0"/>
-              <a:t>github </a:t>
-            </a:r>
-            <a:r>
-              <a:rPr lang="ko-KR" altLang="en-US" sz="1600" smtClean="0"/>
-              <a:t>저장소로 보낸다</a:t>
-            </a:r>
-            <a:r>
-              <a:rPr lang="en-US" altLang="ko-KR" sz="1600" smtClean="0"/>
-              <a:t>.</a:t>
-            </a:r>
-            <a:endParaRPr lang="ko-KR" altLang="en-US" sz="1600"/>
-          </a:p>
-        </p:txBody>
-      </p:sp>
-      <p:sp>
-        <p:nvSpPr>
-          <p:cNvPr id="9" name="TextBox 8"/>
+            <a:endParaRPr lang="ko-KR" altLang="en-US" sz="1600" b="1"/>
+          </a:p>
+        </p:txBody>
+      </p:sp>
+    </p:spTree>
+    <p:extLst>
+      <p:ext uri="{BB962C8B-B14F-4D97-AF65-F5344CB8AC3E}">
+        <p14:creationId xmlns:p14="http://schemas.microsoft.com/office/powerpoint/2010/main" val="3090370063"/>
+      </p:ext>
+    </p:extLst>
+  </p:cSld>
+  <p:clrMapOvr>
+    <a:masterClrMapping/>
+  </p:clrMapOvr>
+  <p:timing>
+    <p:tnLst>
+      <p:par>
+        <p:cTn id="1" dur="indefinite" restart="never" nodeType="tmRoot"/>
+      </p:par>
+    </p:tnLst>
+  </p:timing>
+</p:sld>
+</file>
+
+<file path=ppt/slides/slide11.xml><?xml version="1.0" encoding="utf-8"?>
+<p:sld xmlns:a="http://schemas.openxmlformats.org/drawingml/2006/main" xmlns:r="http://schemas.openxmlformats.org/officeDocument/2006/relationships" xmlns:p="http://schemas.openxmlformats.org/presentationml/2006/main">
+  <p:cSld>
+    <p:spTree>
+      <p:nvGrpSpPr>
+        <p:cNvPr id="1" name=""/>
+        <p:cNvGrpSpPr/>
+        <p:nvPr/>
+      </p:nvGrpSpPr>
+      <p:grpSpPr>
+        <a:xfrm>
+          <a:off x="0" y="0"/>
+          <a:ext cx="0" cy="0"/>
+          <a:chOff x="0" y="0"/>
+          <a:chExt cx="0" cy="0"/>
+        </a:xfrm>
+      </p:grpSpPr>
+      <p:sp>
+        <p:nvSpPr>
+          <p:cNvPr id="11" name="모서리가 둥근 직사각형 10"/>
+          <p:cNvSpPr/>
+          <p:nvPr/>
+        </p:nvSpPr>
+        <p:spPr>
+          <a:xfrm>
+            <a:off x="0" y="0"/>
+            <a:ext cx="12192000" cy="483326"/>
+          </a:xfrm>
+          <a:prstGeom prst="roundRect">
+            <a:avLst/>
+          </a:prstGeom>
+          <a:solidFill>
+            <a:schemeClr val="accent3">
+              <a:lumMod val="20000"/>
+              <a:lumOff val="80000"/>
+            </a:schemeClr>
+          </a:solidFill>
+          <a:ln>
+            <a:solidFill>
+              <a:schemeClr val="bg1"/>
+            </a:solidFill>
+          </a:ln>
+        </p:spPr>
+        <p:style>
+          <a:lnRef idx="2">
+            <a:schemeClr val="accent1">
+              <a:shade val="50000"/>
+            </a:schemeClr>
+          </a:lnRef>
+          <a:fillRef idx="1">
+            <a:schemeClr val="accent1"/>
+          </a:fillRef>
+          <a:effectRef idx="0">
+            <a:schemeClr val="accent1"/>
+          </a:effectRef>
+          <a:fontRef idx="minor">
+            <a:schemeClr val="lt1"/>
+          </a:fontRef>
+        </p:style>
+        <p:txBody>
+          <a:bodyPr rtlCol="0" anchor="ctr"/>
+          <a:lstStyle/>
+          <a:p>
+            <a:pPr algn="ctr"/>
+            <a:r>
+              <a:rPr lang="en-US" altLang="ko-KR" smtClean="0">
+                <a:solidFill>
+                  <a:sysClr val="windowText" lastClr="000000"/>
+                </a:solidFill>
+              </a:rPr>
+              <a:t>GITHUB</a:t>
+            </a:r>
+            <a:r>
+              <a:rPr lang="ko-KR" altLang="en-US" smtClean="0">
+                <a:solidFill>
+                  <a:sysClr val="windowText" lastClr="000000"/>
+                </a:solidFill>
+              </a:rPr>
+              <a:t>에 프로필 만들기</a:t>
+            </a:r>
+            <a:endParaRPr lang="ko-KR" altLang="en-US">
+              <a:solidFill>
+                <a:sysClr val="windowText" lastClr="000000"/>
+              </a:solidFill>
+            </a:endParaRPr>
+          </a:p>
+        </p:txBody>
+      </p:sp>
+      <p:pic>
+        <p:nvPicPr>
+          <p:cNvPr id="4" name="그림 3"/>
+          <p:cNvPicPr>
+            <a:picLocks noChangeAspect="1"/>
+          </p:cNvPicPr>
+          <p:nvPr/>
+        </p:nvPicPr>
+        <p:blipFill>
+          <a:blip r:embed="rId2"/>
+          <a:stretch>
+            <a:fillRect/>
+          </a:stretch>
+        </p:blipFill>
+        <p:spPr>
+          <a:xfrm>
+            <a:off x="5029200" y="483326"/>
+            <a:ext cx="6306072" cy="3409950"/>
+          </a:xfrm>
+          <a:prstGeom prst="rect">
+            <a:avLst/>
+          </a:prstGeom>
+          <a:ln>
+            <a:solidFill>
+              <a:schemeClr val="accent1">
+                <a:lumMod val="40000"/>
+                <a:lumOff val="60000"/>
+              </a:schemeClr>
+            </a:solidFill>
+          </a:ln>
+        </p:spPr>
+      </p:pic>
+      <p:pic>
+        <p:nvPicPr>
+          <p:cNvPr id="5" name="그림 4"/>
+          <p:cNvPicPr>
+            <a:picLocks noChangeAspect="1"/>
+          </p:cNvPicPr>
+          <p:nvPr/>
+        </p:nvPicPr>
+        <p:blipFill>
+          <a:blip r:embed="rId3"/>
+          <a:stretch>
+            <a:fillRect/>
+          </a:stretch>
+        </p:blipFill>
+        <p:spPr>
+          <a:xfrm>
+            <a:off x="385762" y="819745"/>
+            <a:ext cx="3890963" cy="2396660"/>
+          </a:xfrm>
+          <a:prstGeom prst="rect">
+            <a:avLst/>
+          </a:prstGeom>
+        </p:spPr>
+      </p:pic>
+      <p:sp>
+        <p:nvSpPr>
+          <p:cNvPr id="6" name="오른쪽 화살표 5"/>
+          <p:cNvSpPr/>
+          <p:nvPr/>
+        </p:nvSpPr>
+        <p:spPr>
+          <a:xfrm>
+            <a:off x="4648200" y="1847850"/>
+            <a:ext cx="381000" cy="340451"/>
+          </a:xfrm>
+          <a:prstGeom prst="rightArrow">
+            <a:avLst/>
+          </a:prstGeom>
+          <a:ln>
+            <a:solidFill>
+              <a:srgbClr val="FF0000"/>
+            </a:solidFill>
+          </a:ln>
+        </p:spPr>
+        <p:style>
+          <a:lnRef idx="2">
+            <a:schemeClr val="accent1">
+              <a:shade val="50000"/>
+            </a:schemeClr>
+          </a:lnRef>
+          <a:fillRef idx="1">
+            <a:schemeClr val="accent1"/>
+          </a:fillRef>
+          <a:effectRef idx="0">
+            <a:schemeClr val="accent1"/>
+          </a:effectRef>
+          <a:fontRef idx="minor">
+            <a:schemeClr val="lt1"/>
+          </a:fontRef>
+        </p:style>
+        <p:txBody>
+          <a:bodyPr rtlCol="0" anchor="ctr"/>
+          <a:lstStyle/>
+          <a:p>
+            <a:pPr algn="ctr"/>
+            <a:endParaRPr lang="ko-KR" altLang="en-US"/>
+          </a:p>
+        </p:txBody>
+      </p:sp>
+    </p:spTree>
+    <p:extLst>
+      <p:ext uri="{BB962C8B-B14F-4D97-AF65-F5344CB8AC3E}">
+        <p14:creationId xmlns:p14="http://schemas.microsoft.com/office/powerpoint/2010/main" val="1698076429"/>
+      </p:ext>
+    </p:extLst>
+  </p:cSld>
+  <p:clrMapOvr>
+    <a:masterClrMapping/>
+  </p:clrMapOvr>
+  <p:timing>
+    <p:tnLst>
+      <p:par>
+        <p:cTn id="1" dur="indefinite" restart="never" nodeType="tmRoot"/>
+      </p:par>
+    </p:tnLst>
+  </p:timing>
+</p:sld>
+</file>
+
+<file path=ppt/slides/slide12.xml><?xml version="1.0" encoding="utf-8"?>
+<p:sld xmlns:a="http://schemas.openxmlformats.org/drawingml/2006/main" xmlns:r="http://schemas.openxmlformats.org/officeDocument/2006/relationships" xmlns:p="http://schemas.openxmlformats.org/presentationml/2006/main">
+  <p:cSld>
+    <p:spTree>
+      <p:nvGrpSpPr>
+        <p:cNvPr id="1" name=""/>
+        <p:cNvGrpSpPr/>
+        <p:nvPr/>
+      </p:nvGrpSpPr>
+      <p:grpSpPr>
+        <a:xfrm>
+          <a:off x="0" y="0"/>
+          <a:ext cx="0" cy="0"/>
+          <a:chOff x="0" y="0"/>
+          <a:chExt cx="0" cy="0"/>
+        </a:xfrm>
+      </p:grpSpPr>
+      <p:sp>
+        <p:nvSpPr>
+          <p:cNvPr id="3" name="모서리가 둥근 직사각형 2"/>
+          <p:cNvSpPr/>
+          <p:nvPr/>
+        </p:nvSpPr>
+        <p:spPr>
+          <a:xfrm>
+            <a:off x="0" y="0"/>
+            <a:ext cx="12192000" cy="483326"/>
+          </a:xfrm>
+          <a:prstGeom prst="roundRect">
+            <a:avLst/>
+          </a:prstGeom>
+          <a:solidFill>
+            <a:schemeClr val="accent3">
+              <a:lumMod val="20000"/>
+              <a:lumOff val="80000"/>
+            </a:schemeClr>
+          </a:solidFill>
+          <a:ln>
+            <a:solidFill>
+              <a:schemeClr val="bg1"/>
+            </a:solidFill>
+          </a:ln>
+        </p:spPr>
+        <p:style>
+          <a:lnRef idx="2">
+            <a:schemeClr val="accent1">
+              <a:shade val="50000"/>
+            </a:schemeClr>
+          </a:lnRef>
+          <a:fillRef idx="1">
+            <a:schemeClr val="accent1"/>
+          </a:fillRef>
+          <a:effectRef idx="0">
+            <a:schemeClr val="accent1"/>
+          </a:effectRef>
+          <a:fontRef idx="minor">
+            <a:schemeClr val="lt1"/>
+          </a:fontRef>
+        </p:style>
+        <p:txBody>
+          <a:bodyPr rtlCol="0" anchor="ctr"/>
+          <a:lstStyle/>
+          <a:p>
+            <a:pPr algn="ctr"/>
+            <a:r>
+              <a:rPr lang="ko-KR" altLang="en-US" smtClean="0">
+                <a:solidFill>
+                  <a:sysClr val="windowText" lastClr="000000"/>
+                </a:solidFill>
+              </a:rPr>
+              <a:t>용어 정리</a:t>
+            </a:r>
+            <a:endParaRPr lang="ko-KR" altLang="en-US">
+              <a:solidFill>
+                <a:sysClr val="windowText" lastClr="000000"/>
+              </a:solidFill>
+            </a:endParaRPr>
+          </a:p>
+        </p:txBody>
+      </p:sp>
+      <p:sp>
+        <p:nvSpPr>
+          <p:cNvPr id="4" name="TextBox 3"/>
           <p:cNvSpPr txBox="1"/>
           <p:nvPr/>
         </p:nvSpPr>
         <p:spPr>
           <a:xfrm>
-            <a:off x="5730681" y="2323858"/>
-            <a:ext cx="6116414" cy="338554"/>
+            <a:off x="1086853" y="786063"/>
+            <a:ext cx="10018294" cy="4093428"/>
           </a:xfrm>
           <a:prstGeom prst="rect">
             <a:avLst/>
@@ -3313,26 +3550,700 @@
           </a:bodyPr>
           <a:lstStyle/>
           <a:p>
+            <a:pPr>
+              <a:lnSpc>
+                <a:spcPct val="200000"/>
+              </a:lnSpc>
+            </a:pPr>
             <a:r>
               <a:rPr lang="en-US" altLang="ko-KR" sz="1600" smtClean="0"/>
-              <a:t>git remot -v</a:t>
+              <a:t>CSS – </a:t>
             </a:r>
             <a:r>
               <a:rPr lang="ko-KR" altLang="en-US" sz="1600" smtClean="0"/>
-              <a:t>로 원격 연결 상태를 확인한다</a:t>
+              <a:t>디자인에 최적화된 웹페이지 마크업 언어</a:t>
             </a:r>
             <a:r>
               <a:rPr lang="en-US" altLang="ko-KR" sz="1600" smtClean="0"/>
               <a:t>.</a:t>
             </a:r>
-            <a:endParaRPr lang="ko-KR" altLang="en-US" sz="1600"/>
+          </a:p>
+          <a:p>
+            <a:pPr>
+              <a:lnSpc>
+                <a:spcPct val="200000"/>
+              </a:lnSpc>
+            </a:pPr>
+            <a:r>
+              <a:rPr lang="ko-KR" altLang="en-US" sz="1600" smtClean="0"/>
+              <a:t>엘리먼트 </a:t>
+            </a:r>
+            <a:r>
+              <a:rPr lang="en-US" altLang="ko-KR" sz="1600" smtClean="0"/>
+              <a:t>– </a:t>
+            </a:r>
+            <a:r>
+              <a:rPr lang="ko-KR" altLang="en-US" sz="1600" smtClean="0"/>
+              <a:t>웹 디자인의 최소 단위</a:t>
+            </a:r>
+            <a:r>
+              <a:rPr lang="en-US" altLang="ko-KR" sz="1600" smtClean="0"/>
+              <a:t>, </a:t>
+            </a:r>
+            <a:r>
+              <a:rPr lang="ko-KR" altLang="en-US" sz="1600" smtClean="0"/>
+              <a:t>하나의 객체를 의미함</a:t>
+            </a:r>
+            <a:r>
+              <a:rPr lang="en-US" altLang="ko-KR" sz="1600" smtClean="0"/>
+              <a:t>. </a:t>
+            </a:r>
+            <a:r>
+              <a:rPr lang="ko-KR" altLang="en-US" sz="1600" b="1" smtClean="0"/>
+              <a:t>보통 태그를 지칭할 때 쓰임</a:t>
+            </a:r>
+            <a:r>
+              <a:rPr lang="en-US" altLang="ko-KR" sz="1600" smtClean="0"/>
+              <a:t>.</a:t>
+            </a:r>
+          </a:p>
+          <a:p>
+            <a:pPr>
+              <a:lnSpc>
+                <a:spcPct val="200000"/>
+              </a:lnSpc>
+            </a:pPr>
+            <a:r>
+              <a:rPr lang="ko-KR" altLang="en-US" sz="1600" smtClean="0"/>
+              <a:t>셀렉터 </a:t>
+            </a:r>
+            <a:r>
+              <a:rPr lang="en-US" altLang="ko-KR" sz="1600" smtClean="0"/>
+              <a:t>– </a:t>
+            </a:r>
+            <a:r>
+              <a:rPr lang="ko-KR" altLang="en-US" sz="1600" smtClean="0"/>
+              <a:t>선택자</a:t>
+            </a:r>
+            <a:r>
+              <a:rPr lang="en-US" altLang="ko-KR" sz="1600" smtClean="0"/>
+              <a:t>. </a:t>
+            </a:r>
+            <a:r>
+              <a:rPr lang="ko-KR" altLang="en-US" sz="1600" smtClean="0"/>
+              <a:t>변화시킬 대상을 지칭할 때 쓰임</a:t>
+            </a:r>
+            <a:r>
+              <a:rPr lang="en-US" altLang="ko-KR" sz="1600" smtClean="0"/>
+              <a:t>.</a:t>
+            </a:r>
+          </a:p>
+          <a:p>
+            <a:pPr>
+              <a:lnSpc>
+                <a:spcPct val="200000"/>
+              </a:lnSpc>
+            </a:pPr>
+            <a:r>
+              <a:rPr lang="ko-KR" altLang="en-US" sz="1600" smtClean="0"/>
+              <a:t>클래스 </a:t>
+            </a:r>
+            <a:r>
+              <a:rPr lang="en-US" altLang="ko-KR" sz="1600" smtClean="0"/>
+              <a:t>– </a:t>
+            </a:r>
+            <a:r>
+              <a:rPr lang="ko-KR" altLang="en-US" sz="1600" smtClean="0"/>
+              <a:t>속성을 하나 정해두고</a:t>
+            </a:r>
+            <a:r>
+              <a:rPr lang="en-US" altLang="ko-KR" sz="1600" smtClean="0"/>
+              <a:t>, </a:t>
+            </a:r>
+            <a:r>
+              <a:rPr lang="ko-KR" altLang="en-US" sz="1600" smtClean="0"/>
+              <a:t>여러 속성에서 원하는 태그에 값을 주고 싶을 때 사용</a:t>
+            </a:r>
+            <a:r>
+              <a:rPr lang="en-US" altLang="ko-KR" sz="1600" smtClean="0"/>
+              <a:t>.</a:t>
+            </a:r>
+          </a:p>
+          <a:p>
+            <a:pPr>
+              <a:lnSpc>
+                <a:spcPct val="200000"/>
+              </a:lnSpc>
+            </a:pPr>
+            <a:r>
+              <a:rPr lang="en-US" altLang="ko-KR" sz="1600" smtClean="0"/>
+              <a:t>(</a:t>
+            </a:r>
+            <a:r>
+              <a:rPr lang="ko-KR" altLang="en-US" sz="1600" smtClean="0"/>
+              <a:t>클래스를 부를 때는 </a:t>
+            </a:r>
+            <a:r>
+              <a:rPr lang="en-US" altLang="ko-KR" b="1" smtClean="0">
+                <a:solidFill>
+                  <a:srgbClr val="FF0000"/>
+                </a:solidFill>
+              </a:rPr>
+              <a:t>.</a:t>
+            </a:r>
+            <a:r>
+              <a:rPr lang="ko-KR" altLang="en-US" sz="1600" smtClean="0"/>
+              <a:t>을 사용 함</a:t>
+            </a:r>
+            <a:r>
+              <a:rPr lang="en-US" altLang="ko-KR" sz="1600"/>
+              <a:t>)</a:t>
+            </a:r>
+            <a:endParaRPr lang="en-US" altLang="ko-KR" sz="1600" smtClean="0"/>
+          </a:p>
+          <a:p>
+            <a:pPr>
+              <a:lnSpc>
+                <a:spcPct val="200000"/>
+              </a:lnSpc>
+            </a:pPr>
+            <a:r>
+              <a:rPr lang="en-US" altLang="ko-KR" sz="1600" smtClean="0"/>
+              <a:t>ID – </a:t>
+            </a:r>
+            <a:r>
+              <a:rPr lang="ko-KR" altLang="en-US" sz="1600" smtClean="0"/>
+              <a:t>하나만 있을 수 있다</a:t>
+            </a:r>
+            <a:r>
+              <a:rPr lang="en-US" altLang="ko-KR" sz="1600" smtClean="0"/>
+              <a:t>.</a:t>
+            </a:r>
+          </a:p>
+          <a:p>
+            <a:pPr>
+              <a:lnSpc>
+                <a:spcPct val="200000"/>
+              </a:lnSpc>
+            </a:pPr>
+            <a:r>
+              <a:rPr lang="en-US" altLang="ko-KR" sz="1600" smtClean="0"/>
+              <a:t>(ID</a:t>
+            </a:r>
+            <a:r>
+              <a:rPr lang="ko-KR" altLang="en-US" sz="1600" smtClean="0"/>
+              <a:t>를 부를 때는 </a:t>
+            </a:r>
+            <a:r>
+              <a:rPr lang="en-US" altLang="ko-KR" sz="1600" smtClean="0">
+                <a:solidFill>
+                  <a:srgbClr val="FF0000"/>
+                </a:solidFill>
+              </a:rPr>
+              <a:t>#</a:t>
+            </a:r>
+            <a:r>
+              <a:rPr lang="ko-KR" altLang="en-US" sz="1600" smtClean="0"/>
+              <a:t>을 사용함</a:t>
+            </a:r>
+            <a:r>
+              <a:rPr lang="en-US" altLang="ko-KR" sz="1600" smtClean="0"/>
+              <a:t>)</a:t>
+            </a:r>
+          </a:p>
+          <a:p>
+            <a:pPr>
+              <a:lnSpc>
+                <a:spcPct val="200000"/>
+              </a:lnSpc>
+            </a:pPr>
+            <a:r>
+              <a:rPr lang="ko-KR" altLang="en-US" sz="1600" smtClean="0"/>
+              <a:t>네임 </a:t>
+            </a:r>
+            <a:r>
+              <a:rPr lang="en-US" altLang="ko-KR" sz="1600" smtClean="0"/>
+              <a:t>– </a:t>
+            </a:r>
+            <a:r>
+              <a:rPr lang="ko-KR" altLang="en-US" sz="1600" smtClean="0"/>
+              <a:t>단수이거나 복수일수도 있는 단위</a:t>
+            </a:r>
+            <a:r>
+              <a:rPr lang="en-US" altLang="ko-KR" sz="1600" smtClean="0"/>
+              <a:t>.</a:t>
+            </a:r>
           </a:p>
         </p:txBody>
       </p:sp>
     </p:spTree>
     <p:extLst>
       <p:ext uri="{BB962C8B-B14F-4D97-AF65-F5344CB8AC3E}">
-        <p14:creationId xmlns:p14="http://schemas.microsoft.com/office/powerpoint/2010/main" val="1107291987"/>
+        <p14:creationId xmlns:p14="http://schemas.microsoft.com/office/powerpoint/2010/main" val="1917016563"/>
+      </p:ext>
+    </p:extLst>
+  </p:cSld>
+  <p:clrMapOvr>
+    <a:masterClrMapping/>
+  </p:clrMapOvr>
+  <p:timing>
+    <p:tnLst>
+      <p:par>
+        <p:cTn id="1" dur="indefinite" restart="never" nodeType="tmRoot"/>
+      </p:par>
+    </p:tnLst>
+  </p:timing>
+</p:sld>
+</file>
+
+<file path=ppt/slides/slide13.xml><?xml version="1.0" encoding="utf-8"?>
+<p:sld xmlns:a="http://schemas.openxmlformats.org/drawingml/2006/main" xmlns:r="http://schemas.openxmlformats.org/officeDocument/2006/relationships" xmlns:p="http://schemas.openxmlformats.org/presentationml/2006/main">
+  <p:cSld>
+    <p:spTree>
+      <p:nvGrpSpPr>
+        <p:cNvPr id="1" name=""/>
+        <p:cNvGrpSpPr/>
+        <p:nvPr/>
+      </p:nvGrpSpPr>
+      <p:grpSpPr>
+        <a:xfrm>
+          <a:off x="0" y="0"/>
+          <a:ext cx="0" cy="0"/>
+          <a:chOff x="0" y="0"/>
+          <a:chExt cx="0" cy="0"/>
+        </a:xfrm>
+      </p:grpSpPr>
+      <p:sp>
+        <p:nvSpPr>
+          <p:cNvPr id="11" name="모서리가 둥근 직사각형 10"/>
+          <p:cNvSpPr/>
+          <p:nvPr/>
+        </p:nvSpPr>
+        <p:spPr>
+          <a:xfrm>
+            <a:off x="0" y="0"/>
+            <a:ext cx="12192000" cy="483326"/>
+          </a:xfrm>
+          <a:prstGeom prst="roundRect">
+            <a:avLst/>
+          </a:prstGeom>
+          <a:solidFill>
+            <a:schemeClr val="accent3">
+              <a:lumMod val="20000"/>
+              <a:lumOff val="80000"/>
+            </a:schemeClr>
+          </a:solidFill>
+          <a:ln>
+            <a:solidFill>
+              <a:schemeClr val="bg1"/>
+            </a:solidFill>
+          </a:ln>
+        </p:spPr>
+        <p:style>
+          <a:lnRef idx="2">
+            <a:schemeClr val="accent1">
+              <a:shade val="50000"/>
+            </a:schemeClr>
+          </a:lnRef>
+          <a:fillRef idx="1">
+            <a:schemeClr val="accent1"/>
+          </a:fillRef>
+          <a:effectRef idx="0">
+            <a:schemeClr val="accent1"/>
+          </a:effectRef>
+          <a:fontRef idx="minor">
+            <a:schemeClr val="lt1"/>
+          </a:fontRef>
+        </p:style>
+        <p:txBody>
+          <a:bodyPr rtlCol="0" anchor="ctr"/>
+          <a:lstStyle/>
+          <a:p>
+            <a:pPr algn="ctr"/>
+            <a:r>
+              <a:rPr lang="ko-KR" altLang="en-US" smtClean="0">
+                <a:solidFill>
+                  <a:sysClr val="windowText" lastClr="000000"/>
+                </a:solidFill>
+              </a:rPr>
+              <a:t>터미널로 </a:t>
+            </a:r>
+            <a:r>
+              <a:rPr lang="en-US" altLang="ko-KR" smtClean="0">
+                <a:solidFill>
+                  <a:sysClr val="windowText" lastClr="000000"/>
+                </a:solidFill>
+              </a:rPr>
+              <a:t>Git </a:t>
+            </a:r>
+            <a:r>
+              <a:rPr lang="ko-KR" altLang="en-US" smtClean="0">
+                <a:solidFill>
+                  <a:sysClr val="windowText" lastClr="000000"/>
+                </a:solidFill>
+              </a:rPr>
+              <a:t>처음 생성 과정</a:t>
+            </a:r>
+            <a:endParaRPr lang="ko-KR" altLang="en-US">
+              <a:solidFill>
+                <a:sysClr val="windowText" lastClr="000000"/>
+              </a:solidFill>
+            </a:endParaRPr>
+          </a:p>
+        </p:txBody>
+      </p:sp>
+    </p:spTree>
+    <p:extLst>
+      <p:ext uri="{BB962C8B-B14F-4D97-AF65-F5344CB8AC3E}">
+        <p14:creationId xmlns:p14="http://schemas.microsoft.com/office/powerpoint/2010/main" val="2070775991"/>
+      </p:ext>
+    </p:extLst>
+  </p:cSld>
+  <p:clrMapOvr>
+    <a:masterClrMapping/>
+  </p:clrMapOvr>
+  <p:timing>
+    <p:tnLst>
+      <p:par>
+        <p:cTn id="1" dur="indefinite" restart="never" nodeType="tmRoot"/>
+      </p:par>
+    </p:tnLst>
+  </p:timing>
+</p:sld>
+</file>
+
+<file path=ppt/slides/slide14.xml><?xml version="1.0" encoding="utf-8"?>
+<p:sld xmlns:a="http://schemas.openxmlformats.org/drawingml/2006/main" xmlns:r="http://schemas.openxmlformats.org/officeDocument/2006/relationships" xmlns:p="http://schemas.openxmlformats.org/presentationml/2006/main">
+  <p:cSld>
+    <p:spTree>
+      <p:nvGrpSpPr>
+        <p:cNvPr id="1" name=""/>
+        <p:cNvGrpSpPr/>
+        <p:nvPr/>
+      </p:nvGrpSpPr>
+      <p:grpSpPr>
+        <a:xfrm>
+          <a:off x="0" y="0"/>
+          <a:ext cx="0" cy="0"/>
+          <a:chOff x="0" y="0"/>
+          <a:chExt cx="0" cy="0"/>
+        </a:xfrm>
+      </p:grpSpPr>
+      <p:sp>
+        <p:nvSpPr>
+          <p:cNvPr id="11" name="모서리가 둥근 직사각형 10"/>
+          <p:cNvSpPr/>
+          <p:nvPr/>
+        </p:nvSpPr>
+        <p:spPr>
+          <a:xfrm>
+            <a:off x="0" y="0"/>
+            <a:ext cx="12192000" cy="483326"/>
+          </a:xfrm>
+          <a:prstGeom prst="roundRect">
+            <a:avLst/>
+          </a:prstGeom>
+          <a:solidFill>
+            <a:schemeClr val="accent3">
+              <a:lumMod val="20000"/>
+              <a:lumOff val="80000"/>
+            </a:schemeClr>
+          </a:solidFill>
+          <a:ln>
+            <a:solidFill>
+              <a:schemeClr val="bg1"/>
+            </a:solidFill>
+          </a:ln>
+        </p:spPr>
+        <p:style>
+          <a:lnRef idx="2">
+            <a:schemeClr val="accent1">
+              <a:shade val="50000"/>
+            </a:schemeClr>
+          </a:lnRef>
+          <a:fillRef idx="1">
+            <a:schemeClr val="accent1"/>
+          </a:fillRef>
+          <a:effectRef idx="0">
+            <a:schemeClr val="accent1"/>
+          </a:effectRef>
+          <a:fontRef idx="minor">
+            <a:schemeClr val="lt1"/>
+          </a:fontRef>
+        </p:style>
+        <p:txBody>
+          <a:bodyPr rtlCol="0" anchor="ctr"/>
+          <a:lstStyle/>
+          <a:p>
+            <a:pPr algn="ctr"/>
+            <a:r>
+              <a:rPr lang="ko-KR" altLang="en-US" smtClean="0">
+                <a:solidFill>
+                  <a:sysClr val="windowText" lastClr="000000"/>
+                </a:solidFill>
+              </a:rPr>
+              <a:t>터미널로 </a:t>
+            </a:r>
+            <a:r>
+              <a:rPr lang="en-US" altLang="ko-KR" smtClean="0">
+                <a:solidFill>
+                  <a:sysClr val="windowText" lastClr="000000"/>
+                </a:solidFill>
+              </a:rPr>
+              <a:t>Git </a:t>
+            </a:r>
+            <a:r>
+              <a:rPr lang="ko-KR" altLang="en-US" smtClean="0">
+                <a:solidFill>
+                  <a:sysClr val="windowText" lastClr="000000"/>
+                </a:solidFill>
+              </a:rPr>
+              <a:t>처음 생성 과정</a:t>
+            </a:r>
+            <a:endParaRPr lang="ko-KR" altLang="en-US">
+              <a:solidFill>
+                <a:sysClr val="windowText" lastClr="000000"/>
+              </a:solidFill>
+            </a:endParaRPr>
+          </a:p>
+        </p:txBody>
+      </p:sp>
+    </p:spTree>
+    <p:extLst>
+      <p:ext uri="{BB962C8B-B14F-4D97-AF65-F5344CB8AC3E}">
+        <p14:creationId xmlns:p14="http://schemas.microsoft.com/office/powerpoint/2010/main" val="2445042572"/>
+      </p:ext>
+    </p:extLst>
+  </p:cSld>
+  <p:clrMapOvr>
+    <a:masterClrMapping/>
+  </p:clrMapOvr>
+  <p:timing>
+    <p:tnLst>
+      <p:par>
+        <p:cTn id="1" dur="indefinite" restart="never" nodeType="tmRoot"/>
+      </p:par>
+    </p:tnLst>
+  </p:timing>
+</p:sld>
+</file>
+
+<file path=ppt/slides/slide15.xml><?xml version="1.0" encoding="utf-8"?>
+<p:sld xmlns:a="http://schemas.openxmlformats.org/drawingml/2006/main" xmlns:r="http://schemas.openxmlformats.org/officeDocument/2006/relationships" xmlns:p="http://schemas.openxmlformats.org/presentationml/2006/main">
+  <p:cSld>
+    <p:spTree>
+      <p:nvGrpSpPr>
+        <p:cNvPr id="1" name=""/>
+        <p:cNvGrpSpPr/>
+        <p:nvPr/>
+      </p:nvGrpSpPr>
+      <p:grpSpPr>
+        <a:xfrm>
+          <a:off x="0" y="0"/>
+          <a:ext cx="0" cy="0"/>
+          <a:chOff x="0" y="0"/>
+          <a:chExt cx="0" cy="0"/>
+        </a:xfrm>
+      </p:grpSpPr>
+      <p:sp>
+        <p:nvSpPr>
+          <p:cNvPr id="11" name="모서리가 둥근 직사각형 10"/>
+          <p:cNvSpPr/>
+          <p:nvPr/>
+        </p:nvSpPr>
+        <p:spPr>
+          <a:xfrm>
+            <a:off x="0" y="0"/>
+            <a:ext cx="12192000" cy="483326"/>
+          </a:xfrm>
+          <a:prstGeom prst="roundRect">
+            <a:avLst/>
+          </a:prstGeom>
+          <a:solidFill>
+            <a:schemeClr val="accent3">
+              <a:lumMod val="20000"/>
+              <a:lumOff val="80000"/>
+            </a:schemeClr>
+          </a:solidFill>
+          <a:ln>
+            <a:solidFill>
+              <a:schemeClr val="bg1"/>
+            </a:solidFill>
+          </a:ln>
+        </p:spPr>
+        <p:style>
+          <a:lnRef idx="2">
+            <a:schemeClr val="accent1">
+              <a:shade val="50000"/>
+            </a:schemeClr>
+          </a:lnRef>
+          <a:fillRef idx="1">
+            <a:schemeClr val="accent1"/>
+          </a:fillRef>
+          <a:effectRef idx="0">
+            <a:schemeClr val="accent1"/>
+          </a:effectRef>
+          <a:fontRef idx="minor">
+            <a:schemeClr val="lt1"/>
+          </a:fontRef>
+        </p:style>
+        <p:txBody>
+          <a:bodyPr rtlCol="0" anchor="ctr"/>
+          <a:lstStyle/>
+          <a:p>
+            <a:pPr algn="ctr"/>
+            <a:r>
+              <a:rPr lang="ko-KR" altLang="en-US" smtClean="0">
+                <a:solidFill>
+                  <a:sysClr val="windowText" lastClr="000000"/>
+                </a:solidFill>
+              </a:rPr>
+              <a:t>터미널로 </a:t>
+            </a:r>
+            <a:r>
+              <a:rPr lang="en-US" altLang="ko-KR" smtClean="0">
+                <a:solidFill>
+                  <a:sysClr val="windowText" lastClr="000000"/>
+                </a:solidFill>
+              </a:rPr>
+              <a:t>Git </a:t>
+            </a:r>
+            <a:r>
+              <a:rPr lang="ko-KR" altLang="en-US" smtClean="0">
+                <a:solidFill>
+                  <a:sysClr val="windowText" lastClr="000000"/>
+                </a:solidFill>
+              </a:rPr>
+              <a:t>처음 생성 과정</a:t>
+            </a:r>
+            <a:endParaRPr lang="ko-KR" altLang="en-US">
+              <a:solidFill>
+                <a:sysClr val="windowText" lastClr="000000"/>
+              </a:solidFill>
+            </a:endParaRPr>
+          </a:p>
+        </p:txBody>
+      </p:sp>
+    </p:spTree>
+    <p:extLst>
+      <p:ext uri="{BB962C8B-B14F-4D97-AF65-F5344CB8AC3E}">
+        <p14:creationId xmlns:p14="http://schemas.microsoft.com/office/powerpoint/2010/main" val="3992402358"/>
+      </p:ext>
+    </p:extLst>
+  </p:cSld>
+  <p:clrMapOvr>
+    <a:masterClrMapping/>
+  </p:clrMapOvr>
+  <p:timing>
+    <p:tnLst>
+      <p:par>
+        <p:cTn id="1" dur="indefinite" restart="never" nodeType="tmRoot"/>
+      </p:par>
+    </p:tnLst>
+  </p:timing>
+</p:sld>
+</file>
+
+<file path=ppt/slides/slide16.xml><?xml version="1.0" encoding="utf-8"?>
+<p:sld xmlns:a="http://schemas.openxmlformats.org/drawingml/2006/main" xmlns:r="http://schemas.openxmlformats.org/officeDocument/2006/relationships" xmlns:p="http://schemas.openxmlformats.org/presentationml/2006/main">
+  <p:cSld>
+    <p:spTree>
+      <p:nvGrpSpPr>
+        <p:cNvPr id="1" name=""/>
+        <p:cNvGrpSpPr/>
+        <p:nvPr/>
+      </p:nvGrpSpPr>
+      <p:grpSpPr>
+        <a:xfrm>
+          <a:off x="0" y="0"/>
+          <a:ext cx="0" cy="0"/>
+          <a:chOff x="0" y="0"/>
+          <a:chExt cx="0" cy="0"/>
+        </a:xfrm>
+      </p:grpSpPr>
+      <p:sp>
+        <p:nvSpPr>
+          <p:cNvPr id="11" name="모서리가 둥근 직사각형 10"/>
+          <p:cNvSpPr/>
+          <p:nvPr/>
+        </p:nvSpPr>
+        <p:spPr>
+          <a:xfrm>
+            <a:off x="0" y="0"/>
+            <a:ext cx="12192000" cy="483326"/>
+          </a:xfrm>
+          <a:prstGeom prst="roundRect">
+            <a:avLst/>
+          </a:prstGeom>
+          <a:solidFill>
+            <a:schemeClr val="accent3">
+              <a:lumMod val="20000"/>
+              <a:lumOff val="80000"/>
+            </a:schemeClr>
+          </a:solidFill>
+          <a:ln>
+            <a:solidFill>
+              <a:schemeClr val="bg1"/>
+            </a:solidFill>
+          </a:ln>
+        </p:spPr>
+        <p:style>
+          <a:lnRef idx="2">
+            <a:schemeClr val="accent1">
+              <a:shade val="50000"/>
+            </a:schemeClr>
+          </a:lnRef>
+          <a:fillRef idx="1">
+            <a:schemeClr val="accent1"/>
+          </a:fillRef>
+          <a:effectRef idx="0">
+            <a:schemeClr val="accent1"/>
+          </a:effectRef>
+          <a:fontRef idx="minor">
+            <a:schemeClr val="lt1"/>
+          </a:fontRef>
+        </p:style>
+        <p:txBody>
+          <a:bodyPr rtlCol="0" anchor="ctr"/>
+          <a:lstStyle/>
+          <a:p>
+            <a:pPr algn="ctr"/>
+            <a:r>
+              <a:rPr lang="ko-KR" altLang="en-US" smtClean="0">
+                <a:solidFill>
+                  <a:sysClr val="windowText" lastClr="000000"/>
+                </a:solidFill>
+              </a:rPr>
+              <a:t>터미널로 </a:t>
+            </a:r>
+            <a:r>
+              <a:rPr lang="en-US" altLang="ko-KR" smtClean="0">
+                <a:solidFill>
+                  <a:sysClr val="windowText" lastClr="000000"/>
+                </a:solidFill>
+              </a:rPr>
+              <a:t>Git </a:t>
+            </a:r>
+            <a:r>
+              <a:rPr lang="ko-KR" altLang="en-US" smtClean="0">
+                <a:solidFill>
+                  <a:sysClr val="windowText" lastClr="000000"/>
+                </a:solidFill>
+              </a:rPr>
+              <a:t>처음 생성 과정</a:t>
+            </a:r>
+            <a:endParaRPr lang="ko-KR" altLang="en-US">
+              <a:solidFill>
+                <a:sysClr val="windowText" lastClr="000000"/>
+              </a:solidFill>
+            </a:endParaRPr>
+          </a:p>
+        </p:txBody>
+      </p:sp>
+    </p:spTree>
+    <p:extLst>
+      <p:ext uri="{BB962C8B-B14F-4D97-AF65-F5344CB8AC3E}">
+        <p14:creationId xmlns:p14="http://schemas.microsoft.com/office/powerpoint/2010/main" val="178273614"/>
       </p:ext>
     </p:extLst>
   </p:cSld>
@@ -3375,7 +4286,7 @@
         <p:spPr>
           <a:xfrm>
             <a:off x="1594624" y="613317"/>
-            <a:ext cx="9422781" cy="5016758"/>
+            <a:ext cx="9422781" cy="4401205"/>
           </a:xfrm>
           <a:prstGeom prst="rect">
             <a:avLst/>
@@ -3395,12 +4306,8 @@
               <a:buAutoNum type="arabicPeriod"/>
             </a:pPr>
             <a:r>
-              <a:rPr lang="en-US" altLang="ko-KR" sz="2000" b="1" smtClean="0"/>
-              <a:t>VS CODE </a:t>
-            </a:r>
-            <a:r>
               <a:rPr lang="ko-KR" altLang="en-US" sz="2000" b="1" smtClean="0"/>
-              <a:t>설치</a:t>
+              <a:t>정규식</a:t>
             </a:r>
             <a:endParaRPr lang="en-US" altLang="ko-KR" sz="2000" b="1" smtClean="0"/>
           </a:p>
@@ -3412,20 +4319,8 @@
               <a:buAutoNum type="arabicPeriod"/>
             </a:pPr>
             <a:r>
-              <a:rPr lang="en-US" altLang="ko-KR" sz="2000" b="1" smtClean="0"/>
-              <a:t>VS CODE_One Dark Pro (</a:t>
-            </a:r>
-            <a:r>
               <a:rPr lang="ko-KR" altLang="en-US" sz="2000" b="1" smtClean="0"/>
-              <a:t>테마</a:t>
-            </a:r>
-            <a:r>
-              <a:rPr lang="en-US" altLang="ko-KR" sz="2000" b="1" smtClean="0"/>
-              <a:t>) </a:t>
-            </a:r>
-            <a:r>
-              <a:rPr lang="ko-KR" altLang="en-US" sz="2000" b="1" smtClean="0"/>
-              <a:t>설치</a:t>
+              <a:t>용어 정리</a:t>
             </a:r>
             <a:endParaRPr lang="en-US" altLang="ko-KR" sz="2000" b="1" smtClean="0"/>
           </a:p>
@@ -3437,12 +4332,8 @@
               <a:buAutoNum type="arabicPeriod"/>
             </a:pPr>
             <a:r>
-              <a:rPr lang="en-US" altLang="ko-KR" sz="2000" b="1" smtClean="0"/>
-              <a:t>VS CODE_Live Server </a:t>
-            </a:r>
-            <a:r>
               <a:rPr lang="ko-KR" altLang="en-US" sz="2000" b="1" smtClean="0"/>
-              <a:t>설치</a:t>
+              <a:t>태그별 영역 범위</a:t>
             </a:r>
             <a:endParaRPr lang="en-US" altLang="ko-KR" sz="2000" b="1" smtClean="0"/>
           </a:p>
@@ -3455,11 +4346,19 @@
             </a:pPr>
             <a:r>
               <a:rPr lang="en-US" altLang="ko-KR" sz="2000" b="1" smtClean="0"/>
-              <a:t>VS CODE_MySQL </a:t>
+              <a:t>Video </a:t>
             </a:r>
             <a:r>
               <a:rPr lang="ko-KR" altLang="en-US" sz="2000" b="1" smtClean="0"/>
-              <a:t>설치</a:t>
+              <a:t>태그</a:t>
+            </a:r>
+            <a:r>
+              <a:rPr lang="en-US" altLang="ko-KR" sz="2000" b="1" smtClean="0"/>
+              <a:t>,iframe</a:t>
+            </a:r>
+            <a:r>
+              <a:rPr lang="ko-KR" altLang="en-US" sz="2000" b="1" smtClean="0"/>
+              <a:t> 사용 예시</a:t>
             </a:r>
             <a:endParaRPr lang="en-US" altLang="ko-KR" sz="2000" b="1" smtClean="0"/>
           </a:p>
@@ -3472,11 +4371,11 @@
             </a:pPr>
             <a:r>
               <a:rPr lang="en-US" altLang="ko-KR" sz="2000" b="1" smtClean="0"/>
-              <a:t>VS CODE_Git History </a:t>
-            </a:r>
-            <a:r>
-              <a:rPr lang="ko-KR" altLang="en-US" sz="2000" b="1" smtClean="0"/>
-              <a:t>설치</a:t>
+              <a:t>Audio </a:t>
+            </a:r>
+            <a:r>
+              <a:rPr lang="ko-KR" altLang="en-US" sz="2000" b="1"/>
+              <a:t>태그 사용 예시</a:t>
             </a:r>
             <a:endParaRPr lang="en-US" altLang="ko-KR" sz="2000" b="1" smtClean="0"/>
           </a:p>
@@ -3488,31 +4387,21 @@
               <a:buAutoNum type="arabicPeriod"/>
             </a:pPr>
             <a:r>
-              <a:rPr lang="en-US" altLang="ko-KR" sz="2000" b="1" smtClean="0"/>
-              <a:t>Git </a:t>
-            </a:r>
-            <a:r>
-              <a:rPr lang="ko-KR" altLang="en-US" sz="2000" b="1" smtClean="0"/>
-              <a:t>터미널 에러 및 해결</a:t>
-            </a:r>
-            <a:endParaRPr lang="en-US" altLang="ko-KR" sz="2000" b="1" smtClean="0"/>
-          </a:p>
-          <a:p>
-            <a:pPr marL="342900" indent="-342900">
-              <a:lnSpc>
-                <a:spcPct val="200000"/>
-              </a:lnSpc>
-              <a:buAutoNum type="arabicPeriod"/>
-            </a:pPr>
-            <a:r>
-              <a:rPr lang="en-US" altLang="ko-KR" sz="2000" b="1" smtClean="0"/>
-              <a:t>Git </a:t>
-            </a:r>
-            <a:r>
-              <a:rPr lang="ko-KR" altLang="en-US" sz="2000" b="1" smtClean="0"/>
-              <a:t>초기 설정 명령어 및 자주 사용하는 명령어</a:t>
-            </a:r>
-            <a:endParaRPr lang="en-US" altLang="ko-KR" sz="2000" b="1" smtClean="0"/>
+              <a:rPr lang="ko-KR" altLang="en-US" sz="2000" b="1"/>
+              <a:t>실습 </a:t>
+            </a:r>
+            <a:r>
+              <a:rPr lang="en-US" altLang="ko-KR" sz="2000" b="1"/>
+              <a:t>1(video,iframe,table </a:t>
+            </a:r>
+            <a:r>
+              <a:rPr lang="ko-KR" altLang="en-US" sz="2000" b="1"/>
+              <a:t>활용</a:t>
+            </a:r>
+            <a:r>
+              <a:rPr lang="en-US" altLang="ko-KR" sz="2000" b="1"/>
+              <a:t>)</a:t>
+            </a:r>
           </a:p>
           <a:p>
             <a:pPr marL="342900" indent="-342900">
@@ -3675,8 +4564,8 @@
         </p:nvSpPr>
         <p:spPr>
           <a:xfrm>
-            <a:off x="5077327" y="2061406"/>
-            <a:ext cx="7251032" cy="2677656"/>
+            <a:off x="2470484" y="1163048"/>
+            <a:ext cx="7251032" cy="3323987"/>
           </a:xfrm>
           <a:prstGeom prst="rect">
             <a:avLst/>
@@ -3796,6 +4685,35 @@
               <a:rPr lang="en-US" altLang="ko-KR" sz="1400"/>
               <a:t>replace(/(\..*)\./g, '$1');" /&gt; </a:t>
             </a:r>
+            <a:endParaRPr lang="en-US" altLang="ko-KR" sz="1400" smtClean="0"/>
+          </a:p>
+          <a:p>
+            <a:pPr>
+              <a:lnSpc>
+                <a:spcPct val="150000"/>
+              </a:lnSpc>
+            </a:pPr>
+            <a:endParaRPr lang="en-US" altLang="ko-KR" sz="1400" smtClean="0"/>
+          </a:p>
+          <a:p>
+            <a:pPr>
+              <a:lnSpc>
+                <a:spcPct val="150000"/>
+              </a:lnSpc>
+            </a:pPr>
+            <a:r>
+              <a:rPr lang="en-US" altLang="ko-KR" sz="1400" smtClean="0"/>
+              <a:t>0~9</a:t>
+            </a:r>
+            <a:r>
+              <a:rPr lang="ko-KR" altLang="en-US" sz="1400" smtClean="0"/>
+              <a:t>까지 숫자만 사용 가능</a:t>
+            </a:r>
+            <a:r>
+              <a:rPr lang="en-US" altLang="ko-KR" sz="1400" smtClean="0"/>
+              <a:t>.</a:t>
+            </a:r>
+            <a:endParaRPr lang="en-US" altLang="ko-KR" sz="1400"/>
           </a:p>
           <a:p>
             <a:pPr>
@@ -3852,33 +4770,9 @@
           <a:chExt cx="0" cy="0"/>
         </a:xfrm>
       </p:grpSpPr>
-      <p:pic>
-        <p:nvPicPr>
-          <p:cNvPr id="2" name="그림 1"/>
-          <p:cNvPicPr>
-            <a:picLocks noChangeAspect="1"/>
-          </p:cNvPicPr>
-          <p:nvPr/>
-        </p:nvPicPr>
-        <p:blipFill>
-          <a:blip r:embed="rId2"/>
-          <a:stretch>
-            <a:fillRect/>
-          </a:stretch>
-        </p:blipFill>
-        <p:spPr>
-          <a:xfrm>
-            <a:off x="0" y="754185"/>
-            <a:ext cx="11477625" cy="1762125"/>
-          </a:xfrm>
-          <a:prstGeom prst="rect">
-            <a:avLst/>
-          </a:prstGeom>
-        </p:spPr>
-      </p:pic>
-      <p:sp>
-        <p:nvSpPr>
-          <p:cNvPr id="3" name="모서리가 둥근 직사각형 2"/>
+      <p:sp>
+        <p:nvSpPr>
+          <p:cNvPr id="4" name="모서리가 둥근 직사각형 3"/>
           <p:cNvSpPr/>
           <p:nvPr/>
         </p:nvSpPr>
@@ -3924,28 +4818,12 @@
           <a:p>
             <a:pPr algn="ctr"/>
             <a:r>
-              <a:rPr lang="en-US" altLang="ko-KR" smtClean="0">
+              <a:rPr lang="ko-KR" altLang="en-US" smtClean="0">
                 <a:solidFill>
                   <a:sysClr val="windowText" lastClr="000000"/>
                 </a:solidFill>
               </a:rPr>
-              <a:t>Live Server – Visual Studio Code local </a:t>
-            </a:r>
-            <a:r>
-              <a:rPr lang="ko-KR" altLang="en-US" smtClean="0">
-                <a:solidFill>
-                  <a:sysClr val="windowText" lastClr="000000"/>
-                </a:solidFill>
-              </a:rPr>
-              <a:t>서버 연결을 실시간으로 해줌</a:t>
-            </a:r>
-            <a:r>
-              <a:rPr lang="en-US" altLang="ko-KR" smtClean="0">
-                <a:solidFill>
-                  <a:sysClr val="windowText" lastClr="000000"/>
-                </a:solidFill>
-              </a:rPr>
-              <a:t>.</a:t>
+              <a:t>태그별 영역 범위</a:t>
             </a:r>
             <a:endParaRPr lang="ko-KR" altLang="en-US">
               <a:solidFill>
@@ -3955,10 +4833,261 @@
           </a:p>
         </p:txBody>
       </p:sp>
+      <p:pic>
+        <p:nvPicPr>
+          <p:cNvPr id="9" name="그림 8"/>
+          <p:cNvPicPr>
+            <a:picLocks noChangeAspect="1"/>
+          </p:cNvPicPr>
+          <p:nvPr/>
+        </p:nvPicPr>
+        <p:blipFill>
+          <a:blip r:embed="rId2"/>
+          <a:stretch>
+            <a:fillRect/>
+          </a:stretch>
+        </p:blipFill>
+        <p:spPr>
+          <a:xfrm>
+            <a:off x="5823285" y="3067968"/>
+            <a:ext cx="1800225" cy="457200"/>
+          </a:xfrm>
+          <a:prstGeom prst="rect">
+            <a:avLst/>
+          </a:prstGeom>
+        </p:spPr>
+      </p:pic>
+      <p:pic>
+        <p:nvPicPr>
+          <p:cNvPr id="10" name="그림 9"/>
+          <p:cNvPicPr>
+            <a:picLocks noChangeAspect="1"/>
+          </p:cNvPicPr>
+          <p:nvPr/>
+        </p:nvPicPr>
+        <p:blipFill>
+          <a:blip r:embed="rId3"/>
+          <a:stretch>
+            <a:fillRect/>
+          </a:stretch>
+        </p:blipFill>
+        <p:spPr>
+          <a:xfrm>
+            <a:off x="5823284" y="1966953"/>
+            <a:ext cx="1800225" cy="485775"/>
+          </a:xfrm>
+          <a:prstGeom prst="rect">
+            <a:avLst/>
+          </a:prstGeom>
+        </p:spPr>
+      </p:pic>
+      <p:pic>
+        <p:nvPicPr>
+          <p:cNvPr id="11" name="그림 10"/>
+          <p:cNvPicPr>
+            <a:picLocks noChangeAspect="1"/>
+          </p:cNvPicPr>
+          <p:nvPr/>
+        </p:nvPicPr>
+        <p:blipFill>
+          <a:blip r:embed="rId4"/>
+          <a:stretch>
+            <a:fillRect/>
+          </a:stretch>
+        </p:blipFill>
+        <p:spPr>
+          <a:xfrm>
+            <a:off x="5823285" y="2636523"/>
+            <a:ext cx="1800225" cy="247650"/>
+          </a:xfrm>
+          <a:prstGeom prst="rect">
+            <a:avLst/>
+          </a:prstGeom>
+        </p:spPr>
+      </p:pic>
+      <p:pic>
+        <p:nvPicPr>
+          <p:cNvPr id="12" name="그림 11"/>
+          <p:cNvPicPr>
+            <a:picLocks noChangeAspect="1"/>
+          </p:cNvPicPr>
+          <p:nvPr/>
+        </p:nvPicPr>
+        <p:blipFill>
+          <a:blip r:embed="rId5"/>
+          <a:stretch>
+            <a:fillRect/>
+          </a:stretch>
+        </p:blipFill>
+        <p:spPr>
+          <a:xfrm>
+            <a:off x="7890451" y="1646612"/>
+            <a:ext cx="2365720" cy="1979822"/>
+          </a:xfrm>
+          <a:prstGeom prst="rect">
+            <a:avLst/>
+          </a:prstGeom>
+        </p:spPr>
+      </p:pic>
+      <p:sp>
+        <p:nvSpPr>
+          <p:cNvPr id="13" name="TextBox 12"/>
+          <p:cNvSpPr txBox="1"/>
+          <p:nvPr/>
+        </p:nvSpPr>
+        <p:spPr>
+          <a:xfrm>
+            <a:off x="5823284" y="483326"/>
+            <a:ext cx="6368716" cy="1061829"/>
+          </a:xfrm>
+          <a:prstGeom prst="rect">
+            <a:avLst/>
+          </a:prstGeom>
+          <a:noFill/>
+          <a:ln>
+            <a:solidFill>
+              <a:schemeClr val="accent1"/>
+            </a:solidFill>
+          </a:ln>
+        </p:spPr>
+        <p:txBody>
+          <a:bodyPr wrap="square" rtlCol="0">
+            <a:spAutoFit/>
+          </a:bodyPr>
+          <a:lstStyle/>
+          <a:p>
+            <a:pPr>
+              <a:lnSpc>
+                <a:spcPct val="150000"/>
+              </a:lnSpc>
+            </a:pPr>
+            <a:r>
+              <a:rPr lang="en-US" altLang="ko-KR" sz="1400" smtClean="0"/>
+              <a:t>p</a:t>
+            </a:r>
+            <a:r>
+              <a:rPr lang="ko-KR" altLang="en-US" sz="1400" smtClean="0"/>
+              <a:t>태그 </a:t>
+            </a:r>
+            <a:r>
+              <a:rPr lang="en-US" altLang="ko-KR" sz="1400" smtClean="0"/>
+              <a:t>– </a:t>
+            </a:r>
+            <a:r>
+              <a:rPr lang="ko-KR" altLang="en-US" sz="1400" smtClean="0"/>
+              <a:t>단락별로 나눌 때 사용</a:t>
+            </a:r>
+            <a:r>
+              <a:rPr lang="en-US" altLang="ko-KR" sz="1400" smtClean="0"/>
+              <a:t>. </a:t>
+            </a:r>
+            <a:r>
+              <a:rPr lang="ko-KR" altLang="en-US" sz="1400" smtClean="0"/>
+              <a:t>범위는 라인 전체</a:t>
+            </a:r>
+            <a:endParaRPr lang="en-US" altLang="ko-KR" sz="1400" smtClean="0"/>
+          </a:p>
+          <a:p>
+            <a:pPr>
+              <a:lnSpc>
+                <a:spcPct val="150000"/>
+              </a:lnSpc>
+            </a:pPr>
+            <a:r>
+              <a:rPr lang="en-US" altLang="ko-KR" sz="1400" smtClean="0"/>
+              <a:t>div </a:t>
+            </a:r>
+            <a:r>
+              <a:rPr lang="ko-KR" altLang="en-US" sz="1400" smtClean="0"/>
+              <a:t>태그 </a:t>
+            </a:r>
+            <a:r>
+              <a:rPr lang="en-US" altLang="ko-KR" sz="1400" smtClean="0"/>
+              <a:t>– </a:t>
+            </a:r>
+            <a:r>
+              <a:rPr lang="ko-KR" altLang="en-US" sz="1400" smtClean="0"/>
+              <a:t>특별한 역할을 하지 않음</a:t>
+            </a:r>
+            <a:r>
+              <a:rPr lang="en-US" altLang="ko-KR" sz="1400" smtClean="0"/>
+              <a:t>. </a:t>
+            </a:r>
+            <a:r>
+              <a:rPr lang="ko-KR" altLang="en-US" sz="1400" smtClean="0"/>
+              <a:t>범위는 라인 전체 </a:t>
+            </a:r>
+            <a:r>
+              <a:rPr lang="en-US" altLang="ko-KR" sz="1400" smtClean="0"/>
+              <a:t>display - block</a:t>
+            </a:r>
+          </a:p>
+          <a:p>
+            <a:pPr>
+              <a:lnSpc>
+                <a:spcPct val="150000"/>
+              </a:lnSpc>
+            </a:pPr>
+            <a:r>
+              <a:rPr lang="en-US" altLang="ko-KR" sz="1400" smtClean="0"/>
+              <a:t>span </a:t>
+            </a:r>
+            <a:r>
+              <a:rPr lang="ko-KR" altLang="en-US" sz="1400" smtClean="0"/>
+              <a:t>태그 </a:t>
+            </a:r>
+            <a:r>
+              <a:rPr lang="en-US" altLang="ko-KR" sz="1400" smtClean="0"/>
+              <a:t>– </a:t>
+            </a:r>
+            <a:r>
+              <a:rPr lang="ko-KR" altLang="en-US" sz="1400" smtClean="0"/>
+              <a:t>특별한 역할을 하지 않음</a:t>
+            </a:r>
+            <a:r>
+              <a:rPr lang="en-US" altLang="ko-KR" sz="1400" smtClean="0"/>
+              <a:t>. </a:t>
+            </a:r>
+            <a:r>
+              <a:rPr lang="ko-KR" altLang="en-US" sz="1400" smtClean="0"/>
+              <a:t>범위는 글 까지만</a:t>
+            </a:r>
+            <a:r>
+              <a:rPr lang="en-US" altLang="ko-KR" sz="1400" smtClean="0"/>
+              <a:t>. display - inline</a:t>
+            </a:r>
+            <a:endParaRPr lang="ko-KR" altLang="en-US" sz="1400"/>
+          </a:p>
+        </p:txBody>
+      </p:sp>
+      <p:pic>
+        <p:nvPicPr>
+          <p:cNvPr id="14" name="그림 13"/>
+          <p:cNvPicPr>
+            <a:picLocks noChangeAspect="1"/>
+          </p:cNvPicPr>
+          <p:nvPr/>
+        </p:nvPicPr>
+        <p:blipFill>
+          <a:blip r:embed="rId6"/>
+          <a:stretch>
+            <a:fillRect/>
+          </a:stretch>
+        </p:blipFill>
+        <p:spPr>
+          <a:xfrm>
+            <a:off x="0" y="483326"/>
+            <a:ext cx="5823284" cy="4752335"/>
+          </a:xfrm>
+          <a:prstGeom prst="rect">
+            <a:avLst/>
+          </a:prstGeom>
+        </p:spPr>
+      </p:pic>
     </p:spTree>
     <p:extLst>
       <p:ext uri="{BB962C8B-B14F-4D97-AF65-F5344CB8AC3E}">
-        <p14:creationId xmlns:p14="http://schemas.microsoft.com/office/powerpoint/2010/main" val="1917016563"/>
+        <p14:creationId xmlns:p14="http://schemas.microsoft.com/office/powerpoint/2010/main" val="931503997"/>
       </p:ext>
     </p:extLst>
   </p:cSld>
@@ -3992,57 +5121,9 @@
           <a:chExt cx="0" cy="0"/>
         </a:xfrm>
       </p:grpSpPr>
-      <p:pic>
-        <p:nvPicPr>
-          <p:cNvPr id="2" name="그림 1"/>
-          <p:cNvPicPr>
-            <a:picLocks noChangeAspect="1"/>
-          </p:cNvPicPr>
-          <p:nvPr/>
-        </p:nvPicPr>
-        <p:blipFill>
-          <a:blip r:embed="rId2"/>
-          <a:stretch>
-            <a:fillRect/>
-          </a:stretch>
-        </p:blipFill>
-        <p:spPr>
-          <a:xfrm>
-            <a:off x="261822" y="698693"/>
-            <a:ext cx="3371850" cy="1914525"/>
-          </a:xfrm>
-          <a:prstGeom prst="rect">
-            <a:avLst/>
-          </a:prstGeom>
-        </p:spPr>
-      </p:pic>
-      <p:pic>
-        <p:nvPicPr>
-          <p:cNvPr id="3" name="그림 2"/>
-          <p:cNvPicPr>
-            <a:picLocks noChangeAspect="1"/>
-          </p:cNvPicPr>
-          <p:nvPr/>
-        </p:nvPicPr>
-        <p:blipFill>
-          <a:blip r:embed="rId3"/>
-          <a:stretch>
-            <a:fillRect/>
-          </a:stretch>
-        </p:blipFill>
-        <p:spPr>
-          <a:xfrm>
-            <a:off x="261822" y="3024138"/>
-            <a:ext cx="3374877" cy="816342"/>
-          </a:xfrm>
-          <a:prstGeom prst="rect">
-            <a:avLst/>
-          </a:prstGeom>
-        </p:spPr>
-      </p:pic>
-      <p:sp>
-        <p:nvSpPr>
-          <p:cNvPr id="4" name="모서리가 둥근 직사각형 3"/>
+      <p:sp>
+        <p:nvSpPr>
+          <p:cNvPr id="3" name="모서리가 둥근 직사각형 2"/>
           <p:cNvSpPr/>
           <p:nvPr/>
         </p:nvSpPr>
@@ -4093,7 +5174,7 @@
                   <a:sysClr val="windowText" lastClr="000000"/>
                 </a:solidFill>
               </a:rPr>
-              <a:t>MySQL – mysql</a:t>
+              <a:t>VIDEO </a:t>
             </a:r>
             <a:r>
               <a:rPr lang="ko-KR" altLang="en-US" smtClean="0">
@@ -4101,7 +5182,7 @@
                   <a:sysClr val="windowText" lastClr="000000"/>
                 </a:solidFill>
               </a:rPr>
-              <a:t>을 연동시켜주는 확장팩</a:t>
+              <a:t>태그</a:t>
             </a:r>
             <a:r>
               <a:rPr lang="en-US" altLang="ko-KR" smtClean="0">
@@ -4109,7 +5190,7 @@
                   <a:sysClr val="windowText" lastClr="000000"/>
                 </a:solidFill>
               </a:rPr>
-              <a:t>. Git Histroy – </a:t>
+              <a:t>, iframe </a:t>
             </a:r>
             <a:r>
               <a:rPr lang="ko-KR" altLang="en-US" smtClean="0">
@@ -4117,15 +5198,7 @@
                   <a:sysClr val="windowText" lastClr="000000"/>
                 </a:solidFill>
               </a:rPr>
-              <a:t>깃 사용 내역을 보기 편하게 해줌</a:t>
-            </a:r>
-            <a:r>
-              <a:rPr lang="en-US" altLang="ko-KR" smtClean="0">
-                <a:solidFill>
-                  <a:sysClr val="windowText" lastClr="000000"/>
-                </a:solidFill>
-              </a:rPr>
-              <a:t>.</a:t>
+              <a:t>태그 사용 예시</a:t>
             </a:r>
             <a:endParaRPr lang="ko-KR" altLang="en-US">
               <a:solidFill>
@@ -4135,10 +5208,155 @@
           </a:p>
         </p:txBody>
       </p:sp>
+      <p:pic>
+        <p:nvPicPr>
+          <p:cNvPr id="4" name="그림 3"/>
+          <p:cNvPicPr>
+            <a:picLocks noChangeAspect="1"/>
+          </p:cNvPicPr>
+          <p:nvPr/>
+        </p:nvPicPr>
+        <p:blipFill>
+          <a:blip r:embed="rId2"/>
+          <a:stretch>
+            <a:fillRect/>
+          </a:stretch>
+        </p:blipFill>
+        <p:spPr>
+          <a:xfrm>
+            <a:off x="1" y="483326"/>
+            <a:ext cx="6503542" cy="5241199"/>
+          </a:xfrm>
+          <a:prstGeom prst="rect">
+            <a:avLst/>
+          </a:prstGeom>
+        </p:spPr>
+      </p:pic>
+      <p:pic>
+        <p:nvPicPr>
+          <p:cNvPr id="5" name="그림 4"/>
+          <p:cNvPicPr>
+            <a:picLocks noChangeAspect="1"/>
+          </p:cNvPicPr>
+          <p:nvPr/>
+        </p:nvPicPr>
+        <p:blipFill>
+          <a:blip r:embed="rId3"/>
+          <a:stretch>
+            <a:fillRect/>
+          </a:stretch>
+        </p:blipFill>
+        <p:spPr>
+          <a:xfrm>
+            <a:off x="6503543" y="483326"/>
+            <a:ext cx="5695437" cy="5241199"/>
+          </a:xfrm>
+          <a:prstGeom prst="rect">
+            <a:avLst/>
+          </a:prstGeom>
+          <a:ln>
+            <a:solidFill>
+              <a:schemeClr val="accent1"/>
+            </a:solidFill>
+          </a:ln>
+        </p:spPr>
+      </p:pic>
+      <p:sp>
+        <p:nvSpPr>
+          <p:cNvPr id="6" name="모서리가 둥근 직사각형 5"/>
+          <p:cNvSpPr/>
+          <p:nvPr/>
+        </p:nvSpPr>
+        <p:spPr>
+          <a:xfrm>
+            <a:off x="466725" y="3848100"/>
+            <a:ext cx="6036818" cy="457200"/>
+          </a:xfrm>
+          <a:prstGeom prst="roundRect">
+            <a:avLst/>
+          </a:prstGeom>
+          <a:noFill/>
+          <a:ln>
+            <a:solidFill>
+              <a:srgbClr val="FF0000"/>
+            </a:solidFill>
+          </a:ln>
+        </p:spPr>
+        <p:style>
+          <a:lnRef idx="2">
+            <a:schemeClr val="accent1">
+              <a:shade val="50000"/>
+            </a:schemeClr>
+          </a:lnRef>
+          <a:fillRef idx="1">
+            <a:schemeClr val="accent1"/>
+          </a:fillRef>
+          <a:effectRef idx="0">
+            <a:schemeClr val="accent1"/>
+          </a:effectRef>
+          <a:fontRef idx="minor">
+            <a:schemeClr val="lt1"/>
+          </a:fontRef>
+        </p:style>
+        <p:txBody>
+          <a:bodyPr rtlCol="0" anchor="ctr"/>
+          <a:lstStyle/>
+          <a:p>
+            <a:pPr algn="ctr"/>
+            <a:endParaRPr lang="ko-KR" altLang="en-US"/>
+          </a:p>
+        </p:txBody>
+      </p:sp>
+      <p:sp>
+        <p:nvSpPr>
+          <p:cNvPr id="7" name="모서리가 둥근 직사각형 6"/>
+          <p:cNvSpPr/>
+          <p:nvPr/>
+        </p:nvSpPr>
+        <p:spPr>
+          <a:xfrm>
+            <a:off x="6305549" y="1768112"/>
+            <a:ext cx="3209925" cy="2079988"/>
+          </a:xfrm>
+          <a:prstGeom prst="roundRect">
+            <a:avLst/>
+          </a:prstGeom>
+          <a:noFill/>
+          <a:ln>
+            <a:solidFill>
+              <a:srgbClr val="FF0000"/>
+            </a:solidFill>
+          </a:ln>
+        </p:spPr>
+        <p:style>
+          <a:lnRef idx="2">
+            <a:schemeClr val="accent1">
+              <a:shade val="50000"/>
+            </a:schemeClr>
+          </a:lnRef>
+          <a:fillRef idx="1">
+            <a:schemeClr val="accent1"/>
+          </a:fillRef>
+          <a:effectRef idx="0">
+            <a:schemeClr val="accent1"/>
+          </a:effectRef>
+          <a:fontRef idx="minor">
+            <a:schemeClr val="lt1"/>
+          </a:fontRef>
+        </p:style>
+        <p:txBody>
+          <a:bodyPr rtlCol="0" anchor="ctr"/>
+          <a:lstStyle/>
+          <a:p>
+            <a:pPr algn="ctr"/>
+            <a:endParaRPr lang="ko-KR" altLang="en-US"/>
+          </a:p>
+        </p:txBody>
+      </p:sp>
     </p:spTree>
     <p:extLst>
       <p:ext uri="{BB962C8B-B14F-4D97-AF65-F5344CB8AC3E}">
-        <p14:creationId xmlns:p14="http://schemas.microsoft.com/office/powerpoint/2010/main" val="931503997"/>
+        <p14:creationId xmlns:p14="http://schemas.microsoft.com/office/powerpoint/2010/main" val="3196824181"/>
       </p:ext>
     </p:extLst>
   </p:cSld>
@@ -4172,30 +5390,6 @@
           <a:chExt cx="0" cy="0"/>
         </a:xfrm>
       </p:grpSpPr>
-      <p:pic>
-        <p:nvPicPr>
-          <p:cNvPr id="2" name="그림 1"/>
-          <p:cNvPicPr>
-            <a:picLocks noChangeAspect="1"/>
-          </p:cNvPicPr>
-          <p:nvPr/>
-        </p:nvPicPr>
-        <p:blipFill>
-          <a:blip r:embed="rId2"/>
-          <a:stretch>
-            <a:fillRect/>
-          </a:stretch>
-        </p:blipFill>
-        <p:spPr>
-          <a:xfrm>
-            <a:off x="0" y="755930"/>
-            <a:ext cx="10685417" cy="2416847"/>
-          </a:xfrm>
-          <a:prstGeom prst="rect">
-            <a:avLst/>
-          </a:prstGeom>
-        </p:spPr>
-      </p:pic>
       <p:sp>
         <p:nvSpPr>
           <p:cNvPr id="3" name="모서리가 둥근 직사각형 2"/>
@@ -4249,15 +5443,15 @@
                   <a:sysClr val="windowText" lastClr="000000"/>
                 </a:solidFill>
               </a:rPr>
-              <a:t>Git </a:t>
-            </a:r>
-            <a:r>
-              <a:rPr lang="ko-KR" altLang="en-US" smtClean="0">
+              <a:t>AUDIO </a:t>
+            </a:r>
+            <a:r>
+              <a:rPr lang="ko-KR" altLang="en-US">
                 <a:solidFill>
                   <a:sysClr val="windowText" lastClr="000000"/>
                 </a:solidFill>
               </a:rPr>
-              <a:t>사용 에러</a:t>
+              <a:t>태그 사용 예시</a:t>
             </a:r>
             <a:endParaRPr lang="ko-KR" altLang="en-US">
               <a:solidFill>
@@ -4267,10 +5461,63 @@
           </a:p>
         </p:txBody>
       </p:sp>
+      <p:pic>
+        <p:nvPicPr>
+          <p:cNvPr id="2" name="그림 1"/>
+          <p:cNvPicPr>
+            <a:picLocks noChangeAspect="1"/>
+          </p:cNvPicPr>
+          <p:nvPr/>
+        </p:nvPicPr>
+        <p:blipFill>
+          <a:blip r:embed="rId2"/>
+          <a:stretch>
+            <a:fillRect/>
+          </a:stretch>
+        </p:blipFill>
+        <p:spPr>
+          <a:xfrm>
+            <a:off x="-1" y="483325"/>
+            <a:ext cx="6273175" cy="5296612"/>
+          </a:xfrm>
+          <a:prstGeom prst="rect">
+            <a:avLst/>
+          </a:prstGeom>
+        </p:spPr>
+      </p:pic>
+      <p:pic>
+        <p:nvPicPr>
+          <p:cNvPr id="6" name="그림 5"/>
+          <p:cNvPicPr>
+            <a:picLocks noChangeAspect="1"/>
+          </p:cNvPicPr>
+          <p:nvPr/>
+        </p:nvPicPr>
+        <p:blipFill>
+          <a:blip r:embed="rId3"/>
+          <a:stretch>
+            <a:fillRect/>
+          </a:stretch>
+        </p:blipFill>
+        <p:spPr>
+          <a:xfrm>
+            <a:off x="6273175" y="483325"/>
+            <a:ext cx="5918825" cy="5296612"/>
+          </a:xfrm>
+          <a:prstGeom prst="rect">
+            <a:avLst/>
+          </a:prstGeom>
+          <a:ln>
+            <a:solidFill>
+              <a:schemeClr val="accent1"/>
+            </a:solidFill>
+          </a:ln>
+        </p:spPr>
+      </p:pic>
     </p:spTree>
     <p:extLst>
       <p:ext uri="{BB962C8B-B14F-4D97-AF65-F5344CB8AC3E}">
-        <p14:creationId xmlns:p14="http://schemas.microsoft.com/office/powerpoint/2010/main" val="3196824181"/>
+        <p14:creationId xmlns:p14="http://schemas.microsoft.com/office/powerpoint/2010/main" val="2172183285"/>
       </p:ext>
     </p:extLst>
   </p:cSld>
@@ -4306,7 +5553,7 @@
       </p:grpSpPr>
       <p:sp>
         <p:nvSpPr>
-          <p:cNvPr id="3" name="모서리가 둥근 직사각형 2"/>
+          <p:cNvPr id="11" name="모서리가 둥근 직사각형 10"/>
           <p:cNvSpPr/>
           <p:nvPr/>
         </p:nvSpPr>
@@ -4352,12 +5599,28 @@
           <a:p>
             <a:pPr algn="ctr"/>
             <a:r>
+              <a:rPr lang="ko-KR" altLang="en-US" smtClean="0">
+                <a:solidFill>
+                  <a:sysClr val="windowText" lastClr="000000"/>
+                </a:solidFill>
+              </a:rPr>
+              <a:t>실습 </a:t>
+            </a:r>
+            <a:r>
               <a:rPr lang="en-US" altLang="ko-KR" smtClean="0">
                 <a:solidFill>
                   <a:sysClr val="windowText" lastClr="000000"/>
                 </a:solidFill>
               </a:rPr>
-              <a:t>Git </a:t>
+              <a:t>1(video</a:t>
+            </a:r>
+            <a:r>
+              <a:rPr lang="en-US" altLang="ko-KR" smtClean="0">
+                <a:solidFill>
+                  <a:sysClr val="windowText" lastClr="000000"/>
+                </a:solidFill>
+              </a:rPr>
+              <a:t>,iframe,table </a:t>
             </a:r>
             <a:r>
               <a:rPr lang="ko-KR" altLang="en-US" smtClean="0">
@@ -4365,7 +5628,15 @@
                   <a:sysClr val="windowText" lastClr="000000"/>
                 </a:solidFill>
               </a:rPr>
-              <a:t>에러 해결방법</a:t>
+              <a:t>활용</a:t>
+            </a:r>
+            <a:r>
+              <a:rPr lang="en-US" altLang="ko-KR" smtClean="0">
+                <a:solidFill>
+                  <a:sysClr val="windowText" lastClr="000000"/>
+                </a:solidFill>
+              </a:rPr>
+              <a:t>)</a:t>
             </a:r>
             <a:endParaRPr lang="ko-KR" altLang="en-US">
               <a:solidFill>
@@ -4377,7 +5648,7 @@
       </p:sp>
       <p:pic>
         <p:nvPicPr>
-          <p:cNvPr id="4" name="그림 3"/>
+          <p:cNvPr id="2" name="그림 1"/>
           <p:cNvPicPr>
             <a:picLocks noChangeAspect="1"/>
           </p:cNvPicPr>
@@ -4391,85 +5662,42 @@
         </p:blipFill>
         <p:spPr>
           <a:xfrm>
-            <a:off x="0" y="738820"/>
-            <a:ext cx="9733285" cy="2403606"/>
+            <a:off x="0" y="483326"/>
+            <a:ext cx="6561733" cy="5631724"/>
           </a:xfrm>
           <a:prstGeom prst="rect">
             <a:avLst/>
           </a:prstGeom>
         </p:spPr>
       </p:pic>
-      <p:sp>
-        <p:nvSpPr>
-          <p:cNvPr id="5" name="TextBox 4"/>
-          <p:cNvSpPr txBox="1"/>
+      <p:pic>
+        <p:nvPicPr>
+          <p:cNvPr id="7" name="그림 6"/>
+          <p:cNvPicPr>
+            <a:picLocks noChangeAspect="1"/>
+          </p:cNvPicPr>
           <p:nvPr/>
-        </p:nvSpPr>
-        <p:spPr>
-          <a:xfrm>
-            <a:off x="0" y="3523129"/>
-            <a:ext cx="9733285" cy="646331"/>
+        </p:nvPicPr>
+        <p:blipFill>
+          <a:blip r:embed="rId3"/>
+          <a:stretch>
+            <a:fillRect/>
+          </a:stretch>
+        </p:blipFill>
+        <p:spPr>
+          <a:xfrm>
+            <a:off x="6561733" y="483326"/>
+            <a:ext cx="5630267" cy="4812574"/>
           </a:xfrm>
           <a:prstGeom prst="rect">
             <a:avLst/>
           </a:prstGeom>
-          <a:noFill/>
-        </p:spPr>
-        <p:txBody>
-          <a:bodyPr wrap="square" rtlCol="0">
-            <a:spAutoFit/>
-          </a:bodyPr>
-          <a:lstStyle/>
-          <a:p>
-            <a:r>
-              <a:rPr lang="ko-KR" altLang="en-US" smtClean="0"/>
-              <a:t>터미널을 그냥 생성해서 사용하려고 하니</a:t>
-            </a:r>
-            <a:r>
-              <a:rPr lang="en-US" altLang="ko-KR" smtClean="0"/>
-              <a:t>, git </a:t>
-            </a:r>
-            <a:r>
-              <a:rPr lang="ko-KR" altLang="en-US" smtClean="0"/>
-              <a:t>설치를 했음에도 인식하지 못하고 있었음</a:t>
-            </a:r>
-            <a:r>
-              <a:rPr lang="en-US" altLang="ko-KR" smtClean="0"/>
-              <a:t>.</a:t>
-            </a:r>
-          </a:p>
-          <a:p>
-            <a:r>
-              <a:rPr lang="ko-KR" altLang="en-US" smtClean="0"/>
-              <a:t>터미널을 </a:t>
-            </a:r>
-            <a:r>
-              <a:rPr lang="en-US" altLang="ko-KR" smtClean="0"/>
-              <a:t>Git Bash</a:t>
-            </a:r>
-            <a:r>
-              <a:rPr lang="ko-KR" altLang="en-US" smtClean="0"/>
-              <a:t>로 다시 오픈하니 </a:t>
-            </a:r>
-            <a:r>
-              <a:rPr lang="en-US" altLang="ko-KR" smtClean="0"/>
-              <a:t>Git </a:t>
-            </a:r>
-            <a:r>
-              <a:rPr lang="ko-KR" altLang="en-US" smtClean="0"/>
-              <a:t>명령어 사용이 가능했음</a:t>
-            </a:r>
-            <a:r>
-              <a:rPr lang="en-US" altLang="ko-KR" smtClean="0"/>
-              <a:t>.</a:t>
-            </a:r>
-          </a:p>
-        </p:txBody>
-      </p:sp>
+        </p:spPr>
+      </p:pic>
     </p:spTree>
     <p:extLst>
       <p:ext uri="{BB962C8B-B14F-4D97-AF65-F5344CB8AC3E}">
-        <p14:creationId xmlns:p14="http://schemas.microsoft.com/office/powerpoint/2010/main" val="2172183285"/>
+        <p14:creationId xmlns:p14="http://schemas.microsoft.com/office/powerpoint/2010/main" val="2371689806"/>
       </p:ext>
     </p:extLst>
   </p:cSld>
@@ -4503,196 +5731,6 @@
           <a:chExt cx="0" cy="0"/>
         </a:xfrm>
       </p:grpSpPr>
-      <p:pic>
-        <p:nvPicPr>
-          <p:cNvPr id="3" name="그림 2"/>
-          <p:cNvPicPr>
-            <a:picLocks noChangeAspect="1"/>
-          </p:cNvPicPr>
-          <p:nvPr/>
-        </p:nvPicPr>
-        <p:blipFill>
-          <a:blip r:embed="rId2"/>
-          <a:stretch>
-            <a:fillRect/>
-          </a:stretch>
-        </p:blipFill>
-        <p:spPr>
-          <a:xfrm>
-            <a:off x="-1" y="2440135"/>
-            <a:ext cx="5857875" cy="637014"/>
-          </a:xfrm>
-          <a:prstGeom prst="rect">
-            <a:avLst/>
-          </a:prstGeom>
-        </p:spPr>
-      </p:pic>
-      <p:pic>
-        <p:nvPicPr>
-          <p:cNvPr id="4" name="그림 3"/>
-          <p:cNvPicPr>
-            <a:picLocks noChangeAspect="1"/>
-          </p:cNvPicPr>
-          <p:nvPr/>
-        </p:nvPicPr>
-        <p:blipFill>
-          <a:blip r:embed="rId3"/>
-          <a:stretch>
-            <a:fillRect/>
-          </a:stretch>
-        </p:blipFill>
-        <p:spPr>
-          <a:xfrm>
-            <a:off x="0" y="554069"/>
-            <a:ext cx="5857875" cy="1533525"/>
-          </a:xfrm>
-          <a:prstGeom prst="rect">
-            <a:avLst/>
-          </a:prstGeom>
-        </p:spPr>
-      </p:pic>
-      <p:sp>
-        <p:nvSpPr>
-          <p:cNvPr id="5" name="TextBox 4"/>
-          <p:cNvSpPr txBox="1"/>
-          <p:nvPr/>
-        </p:nvSpPr>
-        <p:spPr>
-          <a:xfrm>
-            <a:off x="6356194" y="554069"/>
-            <a:ext cx="5140712" cy="338554"/>
-          </a:xfrm>
-          <a:prstGeom prst="rect">
-            <a:avLst/>
-          </a:prstGeom>
-          <a:noFill/>
-        </p:spPr>
-        <p:txBody>
-          <a:bodyPr wrap="square" rtlCol="0">
-            <a:spAutoFit/>
-          </a:bodyPr>
-          <a:lstStyle/>
-          <a:p>
-            <a:r>
-              <a:rPr lang="en-US" altLang="ko-KR" sz="1600" smtClean="0"/>
-              <a:t>1 . git init</a:t>
-            </a:r>
-            <a:r>
-              <a:rPr lang="ko-KR" altLang="en-US" sz="1600" smtClean="0"/>
-              <a:t>으로 깃으로 현재 경로 등록하기</a:t>
-            </a:r>
-            <a:endParaRPr lang="ko-KR" altLang="en-US" sz="1600"/>
-          </a:p>
-        </p:txBody>
-      </p:sp>
-      <p:sp>
-        <p:nvSpPr>
-          <p:cNvPr id="6" name="TextBox 5"/>
-          <p:cNvSpPr txBox="1"/>
-          <p:nvPr/>
-        </p:nvSpPr>
-        <p:spPr>
-          <a:xfrm>
-            <a:off x="6356195" y="2440135"/>
-            <a:ext cx="5140712" cy="584775"/>
-          </a:xfrm>
-          <a:prstGeom prst="rect">
-            <a:avLst/>
-          </a:prstGeom>
-          <a:noFill/>
-        </p:spPr>
-        <p:txBody>
-          <a:bodyPr wrap="square" rtlCol="0">
-            <a:spAutoFit/>
-          </a:bodyPr>
-          <a:lstStyle/>
-          <a:p>
-            <a:r>
-              <a:rPr lang="en-US" altLang="ko-KR" sz="1600" smtClean="0"/>
-              <a:t>2 . git add . </a:t>
-            </a:r>
-            <a:r>
-              <a:rPr lang="ko-KR" altLang="en-US" sz="1600" smtClean="0"/>
-              <a:t>현재 경로내에 작업 변경 내용을 스테이징 영역</a:t>
-            </a:r>
-            <a:r>
-              <a:rPr lang="en-US" altLang="ko-KR" sz="1600" smtClean="0"/>
-              <a:t>(staging area)</a:t>
-            </a:r>
-            <a:r>
-              <a:rPr lang="ko-KR" altLang="en-US" sz="1600" smtClean="0"/>
-              <a:t>에 추가하기 위해서 사용</a:t>
-            </a:r>
-            <a:endParaRPr lang="ko-KR" altLang="en-US" sz="1600"/>
-          </a:p>
-        </p:txBody>
-      </p:sp>
-      <p:pic>
-        <p:nvPicPr>
-          <p:cNvPr id="8" name="그림 7"/>
-          <p:cNvPicPr>
-            <a:picLocks noChangeAspect="1"/>
-          </p:cNvPicPr>
-          <p:nvPr/>
-        </p:nvPicPr>
-        <p:blipFill>
-          <a:blip r:embed="rId4"/>
-          <a:stretch>
-            <a:fillRect/>
-          </a:stretch>
-        </p:blipFill>
-        <p:spPr>
-          <a:xfrm>
-            <a:off x="22302" y="3430371"/>
-            <a:ext cx="5835572" cy="2171700"/>
-          </a:xfrm>
-          <a:prstGeom prst="rect">
-            <a:avLst/>
-          </a:prstGeom>
-        </p:spPr>
-      </p:pic>
-      <p:sp>
-        <p:nvSpPr>
-          <p:cNvPr id="9" name="TextBox 8"/>
-          <p:cNvSpPr txBox="1"/>
-          <p:nvPr/>
-        </p:nvSpPr>
-        <p:spPr>
-          <a:xfrm>
-            <a:off x="6356195" y="3430371"/>
-            <a:ext cx="5140712" cy="338554"/>
-          </a:xfrm>
-          <a:prstGeom prst="rect">
-            <a:avLst/>
-          </a:prstGeom>
-          <a:noFill/>
-        </p:spPr>
-        <p:txBody>
-          <a:bodyPr wrap="square" rtlCol="0">
-            <a:spAutoFit/>
-          </a:bodyPr>
-          <a:lstStyle/>
-          <a:p>
-            <a:r>
-              <a:rPr lang="en-US" altLang="ko-KR" sz="1600" smtClean="0"/>
-              <a:t>3 . git status</a:t>
-            </a:r>
-            <a:r>
-              <a:rPr lang="ko-KR" altLang="en-US" sz="1600" smtClean="0"/>
-              <a:t>로 </a:t>
-            </a:r>
-            <a:r>
-              <a:rPr lang="en-US" altLang="ko-KR" sz="1600" smtClean="0"/>
-              <a:t>git </a:t>
-            </a:r>
-            <a:r>
-              <a:rPr lang="ko-KR" altLang="en-US" sz="1600" smtClean="0"/>
-              <a:t>상태 확인하기 </a:t>
-            </a:r>
-            <a:endParaRPr lang="ko-KR" altLang="en-US" sz="1600"/>
-          </a:p>
-        </p:txBody>
-      </p:sp>
       <p:sp>
         <p:nvSpPr>
           <p:cNvPr id="11" name="모서리가 둥근 직사각형 10"/>
@@ -4741,28 +5779,60 @@
           <a:p>
             <a:pPr algn="ctr"/>
             <a:r>
-              <a:rPr lang="ko-KR" altLang="en-US" smtClean="0">
+              <a:rPr lang="en-US" altLang="ko-KR">
                 <a:solidFill>
                   <a:sysClr val="windowText" lastClr="000000"/>
                 </a:solidFill>
               </a:rPr>
-              <a:t>터미널로 </a:t>
-            </a:r>
-            <a:r>
-              <a:rPr lang="en-US" altLang="ko-KR" smtClean="0">
+              <a:t>GITHUB</a:t>
+            </a:r>
+            <a:r>
+              <a:rPr lang="ko-KR" altLang="en-US">
                 <a:solidFill>
                   <a:sysClr val="windowText" lastClr="000000"/>
                 </a:solidFill>
               </a:rPr>
-              <a:t>Git </a:t>
-            </a:r>
-            <a:r>
-              <a:rPr lang="ko-KR" altLang="en-US" smtClean="0">
+              <a:t>에서</a:t>
+            </a:r>
+            <a:r>
+              <a:rPr lang="en-US" altLang="ko-KR">
                 <a:solidFill>
                   <a:sysClr val="windowText" lastClr="000000"/>
                 </a:solidFill>
               </a:rPr>
-              <a:t>처음 생성 과정</a:t>
+              <a:t> </a:t>
+            </a:r>
+            <a:r>
+              <a:rPr lang="ko-KR" altLang="en-US">
+                <a:solidFill>
+                  <a:sysClr val="windowText" lastClr="000000"/>
+                </a:solidFill>
+              </a:rPr>
+              <a:t>내 </a:t>
+            </a:r>
+            <a:r>
+              <a:rPr lang="en-US" altLang="ko-KR">
+                <a:solidFill>
+                  <a:sysClr val="windowText" lastClr="000000"/>
+                </a:solidFill>
+              </a:rPr>
+              <a:t>PAGE </a:t>
+            </a:r>
+            <a:r>
+              <a:rPr lang="ko-KR" altLang="en-US">
+                <a:solidFill>
+                  <a:sysClr val="windowText" lastClr="000000"/>
+                </a:solidFill>
+              </a:rPr>
+              <a:t>만들기</a:t>
+            </a:r>
+            <a:r>
+              <a:rPr lang="en-US" altLang="ko-KR">
+                <a:solidFill>
+                  <a:sysClr val="windowText" lastClr="000000"/>
+                </a:solidFill>
+              </a:rPr>
+              <a:t> </a:t>
             </a:r>
             <a:endParaRPr lang="ko-KR" altLang="en-US">
               <a:solidFill>
@@ -4772,10 +5842,172 @@
           </a:p>
         </p:txBody>
       </p:sp>
+      <p:pic>
+        <p:nvPicPr>
+          <p:cNvPr id="2" name="그림 1"/>
+          <p:cNvPicPr>
+            <a:picLocks noChangeAspect="1"/>
+          </p:cNvPicPr>
+          <p:nvPr/>
+        </p:nvPicPr>
+        <p:blipFill>
+          <a:blip r:embed="rId2"/>
+          <a:stretch>
+            <a:fillRect/>
+          </a:stretch>
+        </p:blipFill>
+        <p:spPr>
+          <a:xfrm>
+            <a:off x="0" y="636950"/>
+            <a:ext cx="5991225" cy="3543299"/>
+          </a:xfrm>
+          <a:prstGeom prst="rect">
+            <a:avLst/>
+          </a:prstGeom>
+        </p:spPr>
+      </p:pic>
+      <p:pic>
+        <p:nvPicPr>
+          <p:cNvPr id="3" name="그림 2"/>
+          <p:cNvPicPr>
+            <a:picLocks noChangeAspect="1"/>
+          </p:cNvPicPr>
+          <p:nvPr/>
+        </p:nvPicPr>
+        <p:blipFill>
+          <a:blip r:embed="rId3"/>
+          <a:stretch>
+            <a:fillRect/>
+          </a:stretch>
+        </p:blipFill>
+        <p:spPr>
+          <a:xfrm>
+            <a:off x="6500812" y="779824"/>
+            <a:ext cx="2855867" cy="3096850"/>
+          </a:xfrm>
+          <a:prstGeom prst="rect">
+            <a:avLst/>
+          </a:prstGeom>
+        </p:spPr>
+      </p:pic>
+      <p:sp>
+        <p:nvSpPr>
+          <p:cNvPr id="4" name="오른쪽 화살표 3"/>
+          <p:cNvSpPr/>
+          <p:nvPr/>
+        </p:nvSpPr>
+        <p:spPr>
+          <a:xfrm>
+            <a:off x="6148387" y="2171087"/>
+            <a:ext cx="352425" cy="314325"/>
+          </a:xfrm>
+          <a:prstGeom prst="rightArrow">
+            <a:avLst/>
+          </a:prstGeom>
+          <a:ln>
+            <a:solidFill>
+              <a:srgbClr val="FF0000"/>
+            </a:solidFill>
+          </a:ln>
+        </p:spPr>
+        <p:style>
+          <a:lnRef idx="2">
+            <a:schemeClr val="accent1">
+              <a:shade val="50000"/>
+            </a:schemeClr>
+          </a:lnRef>
+          <a:fillRef idx="1">
+            <a:schemeClr val="accent1"/>
+          </a:fillRef>
+          <a:effectRef idx="0">
+            <a:schemeClr val="accent1"/>
+          </a:effectRef>
+          <a:fontRef idx="minor">
+            <a:schemeClr val="lt1"/>
+          </a:fontRef>
+        </p:style>
+        <p:txBody>
+          <a:bodyPr rtlCol="0" anchor="ctr"/>
+          <a:lstStyle/>
+          <a:p>
+            <a:pPr algn="ctr"/>
+            <a:endParaRPr lang="ko-KR" altLang="en-US"/>
+          </a:p>
+        </p:txBody>
+      </p:sp>
+      <p:pic>
+        <p:nvPicPr>
+          <p:cNvPr id="5" name="그림 4"/>
+          <p:cNvPicPr>
+            <a:picLocks noChangeAspect="1"/>
+          </p:cNvPicPr>
+          <p:nvPr/>
+        </p:nvPicPr>
+        <p:blipFill>
+          <a:blip r:embed="rId4"/>
+          <a:stretch>
+            <a:fillRect/>
+          </a:stretch>
+        </p:blipFill>
+        <p:spPr>
+          <a:xfrm>
+            <a:off x="5644310" y="4476747"/>
+            <a:ext cx="5147516" cy="2148963"/>
+          </a:xfrm>
+          <a:prstGeom prst="rect">
+            <a:avLst/>
+          </a:prstGeom>
+        </p:spPr>
+      </p:pic>
+      <p:sp>
+        <p:nvSpPr>
+          <p:cNvPr id="6" name="아래쪽 화살표 5"/>
+          <p:cNvSpPr/>
+          <p:nvPr/>
+        </p:nvSpPr>
+        <p:spPr>
+          <a:xfrm>
+            <a:off x="7790632" y="4180249"/>
+            <a:ext cx="276225" cy="314325"/>
+          </a:xfrm>
+          <a:prstGeom prst="downArrow">
+            <a:avLst/>
+          </a:prstGeom>
+          <a:ln>
+            <a:solidFill>
+              <a:srgbClr val="FF0000"/>
+            </a:solidFill>
+          </a:ln>
+        </p:spPr>
+        <p:style>
+          <a:lnRef idx="2">
+            <a:schemeClr val="accent1">
+              <a:shade val="50000"/>
+            </a:schemeClr>
+          </a:lnRef>
+          <a:fillRef idx="1">
+            <a:schemeClr val="accent1"/>
+          </a:fillRef>
+          <a:effectRef idx="0">
+            <a:schemeClr val="accent1"/>
+          </a:effectRef>
+          <a:fontRef idx="minor">
+            <a:schemeClr val="lt1"/>
+          </a:fontRef>
+        </p:style>
+        <p:txBody>
+          <a:bodyPr rtlCol="0" anchor="ctr"/>
+          <a:lstStyle/>
+          <a:p>
+            <a:pPr algn="ctr"/>
+            <a:endParaRPr lang="ko-KR" altLang="en-US"/>
+          </a:p>
+        </p:txBody>
+      </p:sp>
     </p:spTree>
     <p:extLst>
       <p:ext uri="{BB962C8B-B14F-4D97-AF65-F5344CB8AC3E}">
-        <p14:creationId xmlns:p14="http://schemas.microsoft.com/office/powerpoint/2010/main" val="2371689806"/>
+        <p14:creationId xmlns:p14="http://schemas.microsoft.com/office/powerpoint/2010/main" val="2190800043"/>
       </p:ext>
     </p:extLst>
   </p:cSld>
@@ -4809,81 +6041,9 @@
           <a:chExt cx="0" cy="0"/>
         </a:xfrm>
       </p:grpSpPr>
-      <p:pic>
-        <p:nvPicPr>
-          <p:cNvPr id="3" name="그림 2"/>
-          <p:cNvPicPr>
-            <a:picLocks noChangeAspect="1"/>
-          </p:cNvPicPr>
-          <p:nvPr/>
-        </p:nvPicPr>
-        <p:blipFill>
-          <a:blip r:embed="rId2"/>
-          <a:stretch>
-            <a:fillRect/>
-          </a:stretch>
-        </p:blipFill>
-        <p:spPr>
-          <a:xfrm>
-            <a:off x="0" y="476194"/>
-            <a:ext cx="4410075" cy="1895475"/>
-          </a:xfrm>
-          <a:prstGeom prst="rect">
-            <a:avLst/>
-          </a:prstGeom>
-        </p:spPr>
-      </p:pic>
-      <p:pic>
-        <p:nvPicPr>
-          <p:cNvPr id="5" name="그림 4"/>
-          <p:cNvPicPr>
-            <a:picLocks noChangeAspect="1"/>
-          </p:cNvPicPr>
-          <p:nvPr/>
-        </p:nvPicPr>
-        <p:blipFill>
-          <a:blip r:embed="rId3"/>
-          <a:stretch>
-            <a:fillRect/>
-          </a:stretch>
-        </p:blipFill>
-        <p:spPr>
-          <a:xfrm>
-            <a:off x="-1" y="2689014"/>
-            <a:ext cx="4410075" cy="1054163"/>
-          </a:xfrm>
-          <a:prstGeom prst="rect">
-            <a:avLst/>
-          </a:prstGeom>
-        </p:spPr>
-      </p:pic>
-      <p:pic>
-        <p:nvPicPr>
-          <p:cNvPr id="7" name="그림 6"/>
-          <p:cNvPicPr>
-            <a:picLocks noChangeAspect="1"/>
-          </p:cNvPicPr>
-          <p:nvPr/>
-        </p:nvPicPr>
-        <p:blipFill>
-          <a:blip r:embed="rId4"/>
-          <a:stretch>
-            <a:fillRect/>
-          </a:stretch>
-        </p:blipFill>
-        <p:spPr>
-          <a:xfrm>
-            <a:off x="0" y="4393060"/>
-            <a:ext cx="4419600" cy="1666875"/>
-          </a:xfrm>
-          <a:prstGeom prst="rect">
-            <a:avLst/>
-          </a:prstGeom>
-        </p:spPr>
-      </p:pic>
-      <p:sp>
-        <p:nvSpPr>
-          <p:cNvPr id="8" name="모서리가 둥근 직사각형 7"/>
+      <p:sp>
+        <p:nvSpPr>
+          <p:cNvPr id="11" name="모서리가 둥근 직사각형 10"/>
           <p:cNvSpPr/>
           <p:nvPr/>
         </p:nvSpPr>
@@ -4929,28 +6089,60 @@
           <a:p>
             <a:pPr algn="ctr"/>
             <a:r>
-              <a:rPr lang="en-US" altLang="ko-KR" smtClean="0">
+              <a:rPr lang="en-US" altLang="ko-KR">
                 <a:solidFill>
                   <a:sysClr val="windowText" lastClr="000000"/>
                 </a:solidFill>
               </a:rPr>
-              <a:t>Git </a:t>
-            </a:r>
-            <a:r>
-              <a:rPr lang="ko-KR" altLang="en-US" smtClean="0">
+              <a:t>GITHUB</a:t>
+            </a:r>
+            <a:r>
+              <a:rPr lang="ko-KR" altLang="en-US">
                 <a:solidFill>
                   <a:sysClr val="windowText" lastClr="000000"/>
                 </a:solidFill>
               </a:rPr>
-              <a:t>자주 사용하는 명령어 </a:t>
-            </a:r>
-            <a:r>
-              <a:rPr lang="en-US" altLang="ko-KR" smtClean="0">
+              <a:t>에서</a:t>
+            </a:r>
+            <a:r>
+              <a:rPr lang="en-US" altLang="ko-KR">
                 <a:solidFill>
                   <a:sysClr val="windowText" lastClr="000000"/>
                 </a:solidFill>
               </a:rPr>
-              <a:t>– commit, log, status</a:t>
+              <a:t> </a:t>
+            </a:r>
+            <a:r>
+              <a:rPr lang="ko-KR" altLang="en-US">
+                <a:solidFill>
+                  <a:sysClr val="windowText" lastClr="000000"/>
+                </a:solidFill>
+              </a:rPr>
+              <a:t>내 </a:t>
+            </a:r>
+            <a:r>
+              <a:rPr lang="en-US" altLang="ko-KR">
+                <a:solidFill>
+                  <a:sysClr val="windowText" lastClr="000000"/>
+                </a:solidFill>
+              </a:rPr>
+              <a:t>PAGE </a:t>
+            </a:r>
+            <a:r>
+              <a:rPr lang="ko-KR" altLang="en-US">
+                <a:solidFill>
+                  <a:sysClr val="windowText" lastClr="000000"/>
+                </a:solidFill>
+              </a:rPr>
+              <a:t>만들기</a:t>
+            </a:r>
+            <a:r>
+              <a:rPr lang="en-US" altLang="ko-KR">
+                <a:solidFill>
+                  <a:sysClr val="windowText" lastClr="000000"/>
+                </a:solidFill>
+              </a:rPr>
+              <a:t> </a:t>
             </a:r>
             <a:endParaRPr lang="ko-KR" altLang="en-US">
               <a:solidFill>
@@ -4960,120 +6152,172 @@
           </a:p>
         </p:txBody>
       </p:sp>
-      <p:sp>
-        <p:nvSpPr>
-          <p:cNvPr id="9" name="TextBox 8"/>
-          <p:cNvSpPr txBox="1"/>
+      <p:pic>
+        <p:nvPicPr>
+          <p:cNvPr id="7" name="그림 6"/>
+          <p:cNvPicPr>
+            <a:picLocks noChangeAspect="1"/>
+          </p:cNvPicPr>
           <p:nvPr/>
-        </p:nvSpPr>
-        <p:spPr>
-          <a:xfrm>
-            <a:off x="5730681" y="497922"/>
-            <a:ext cx="5140712" cy="338554"/>
+        </p:nvPicPr>
+        <p:blipFill>
+          <a:blip r:embed="rId2"/>
+          <a:stretch>
+            <a:fillRect/>
+          </a:stretch>
+        </p:blipFill>
+        <p:spPr>
+          <a:xfrm>
+            <a:off x="128587" y="1014412"/>
+            <a:ext cx="3838575" cy="2238375"/>
           </a:xfrm>
           <a:prstGeom prst="rect">
             <a:avLst/>
           </a:prstGeom>
-          <a:noFill/>
-        </p:spPr>
-        <p:txBody>
-          <a:bodyPr wrap="square" rtlCol="0">
-            <a:spAutoFit/>
-          </a:bodyPr>
-          <a:lstStyle/>
-          <a:p>
-            <a:r>
-              <a:rPr lang="en-US" altLang="ko-KR" sz="1600" smtClean="0"/>
-              <a:t>git commit –m </a:t>
-            </a:r>
-            <a:r>
-              <a:rPr lang="ko-KR" altLang="en-US" sz="1600" smtClean="0"/>
-              <a:t>로 커밋</a:t>
-            </a:r>
-            <a:r>
-              <a:rPr lang="en-US" altLang="ko-KR" sz="1600" smtClean="0"/>
-              <a:t>. –m </a:t>
-            </a:r>
-            <a:r>
-              <a:rPr lang="ko-KR" altLang="en-US" sz="1600" smtClean="0"/>
-              <a:t>으로 커밋 내용 작성</a:t>
-            </a:r>
-            <a:endParaRPr lang="ko-KR" altLang="en-US" sz="1600"/>
-          </a:p>
-        </p:txBody>
-      </p:sp>
-      <p:sp>
-        <p:nvSpPr>
-          <p:cNvPr id="10" name="TextBox 9"/>
-          <p:cNvSpPr txBox="1"/>
+        </p:spPr>
+      </p:pic>
+      <p:pic>
+        <p:nvPicPr>
+          <p:cNvPr id="8" name="그림 7"/>
+          <p:cNvPicPr>
+            <a:picLocks noChangeAspect="1"/>
+          </p:cNvPicPr>
           <p:nvPr/>
-        </p:nvSpPr>
-        <p:spPr>
-          <a:xfrm>
-            <a:off x="5730681" y="2689014"/>
-            <a:ext cx="5140712" cy="338554"/>
+        </p:nvPicPr>
+        <p:blipFill>
+          <a:blip r:embed="rId3"/>
+          <a:stretch>
+            <a:fillRect/>
+          </a:stretch>
+        </p:blipFill>
+        <p:spPr>
+          <a:xfrm>
+            <a:off x="4948238" y="1014412"/>
+            <a:ext cx="4017868" cy="1990726"/>
           </a:xfrm>
           <a:prstGeom prst="rect">
             <a:avLst/>
           </a:prstGeom>
-          <a:noFill/>
-        </p:spPr>
-        <p:txBody>
-          <a:bodyPr wrap="square" rtlCol="0">
-            <a:spAutoFit/>
-          </a:bodyPr>
-          <a:lstStyle/>
-          <a:p>
-            <a:r>
-              <a:rPr lang="en-US" altLang="ko-KR" sz="1600" smtClean="0"/>
-              <a:t>git </a:t>
-            </a:r>
-            <a:r>
-              <a:rPr lang="ko-KR" altLang="en-US" sz="1600" smtClean="0"/>
-              <a:t>상태 확인하기 </a:t>
-            </a:r>
-            <a:endParaRPr lang="ko-KR" altLang="en-US" sz="1600"/>
-          </a:p>
-        </p:txBody>
-      </p:sp>
-      <p:sp>
-        <p:nvSpPr>
-          <p:cNvPr id="11" name="TextBox 10"/>
-          <p:cNvSpPr txBox="1"/>
+        </p:spPr>
+      </p:pic>
+      <p:sp>
+        <p:nvSpPr>
+          <p:cNvPr id="9" name="오른쪽 화살표 8"/>
+          <p:cNvSpPr/>
           <p:nvPr/>
         </p:nvSpPr>
         <p:spPr>
           <a:xfrm>
-            <a:off x="5730681" y="4393060"/>
-            <a:ext cx="5140712" cy="338554"/>
+            <a:off x="4286250" y="1828799"/>
+            <a:ext cx="361950" cy="314324"/>
+          </a:xfrm>
+          <a:prstGeom prst="rightArrow">
+            <a:avLst/>
+          </a:prstGeom>
+          <a:ln>
+            <a:solidFill>
+              <a:srgbClr val="FF0000"/>
+            </a:solidFill>
+          </a:ln>
+        </p:spPr>
+        <p:style>
+          <a:lnRef idx="2">
+            <a:schemeClr val="accent1">
+              <a:shade val="50000"/>
+            </a:schemeClr>
+          </a:lnRef>
+          <a:fillRef idx="1">
+            <a:schemeClr val="accent1"/>
+          </a:fillRef>
+          <a:effectRef idx="0">
+            <a:schemeClr val="accent1"/>
+          </a:effectRef>
+          <a:fontRef idx="minor">
+            <a:schemeClr val="lt1"/>
+          </a:fontRef>
+        </p:style>
+        <p:txBody>
+          <a:bodyPr rtlCol="0" anchor="ctr"/>
+          <a:lstStyle/>
+          <a:p>
+            <a:pPr algn="ctr"/>
+            <a:endParaRPr lang="ko-KR" altLang="en-US"/>
+          </a:p>
+        </p:txBody>
+      </p:sp>
+      <p:pic>
+        <p:nvPicPr>
+          <p:cNvPr id="10" name="그림 9"/>
+          <p:cNvPicPr>
+            <a:picLocks noChangeAspect="1"/>
+          </p:cNvPicPr>
+          <p:nvPr/>
+        </p:nvPicPr>
+        <p:blipFill>
+          <a:blip r:embed="rId4"/>
+          <a:stretch>
+            <a:fillRect/>
+          </a:stretch>
+        </p:blipFill>
+        <p:spPr>
+          <a:xfrm>
+            <a:off x="4467225" y="3469548"/>
+            <a:ext cx="5148263" cy="2983580"/>
           </a:xfrm>
           <a:prstGeom prst="rect">
             <a:avLst/>
           </a:prstGeom>
-          <a:noFill/>
-        </p:spPr>
-        <p:txBody>
-          <a:bodyPr wrap="square" rtlCol="0">
-            <a:spAutoFit/>
-          </a:bodyPr>
-          <a:lstStyle/>
-          <a:p>
-            <a:r>
-              <a:rPr lang="en-US" altLang="ko-KR" sz="1600" smtClean="0"/>
-              <a:t>git </a:t>
-            </a:r>
-            <a:r>
-              <a:rPr lang="ko-KR" altLang="en-US" sz="1600" smtClean="0"/>
-              <a:t>사용 기록 확인하기</a:t>
-            </a:r>
-            <a:endParaRPr lang="ko-KR" altLang="en-US" sz="1600"/>
+        </p:spPr>
+      </p:pic>
+      <p:sp>
+        <p:nvSpPr>
+          <p:cNvPr id="12" name="아래쪽 화살표 11"/>
+          <p:cNvSpPr/>
+          <p:nvPr/>
+        </p:nvSpPr>
+        <p:spPr>
+          <a:xfrm>
+            <a:off x="6793286" y="3165975"/>
+            <a:ext cx="327771" cy="345348"/>
+          </a:xfrm>
+          <a:prstGeom prst="downArrow">
+            <a:avLst/>
+          </a:prstGeom>
+          <a:ln>
+            <a:solidFill>
+              <a:srgbClr val="FF0000"/>
+            </a:solidFill>
+          </a:ln>
+        </p:spPr>
+        <p:style>
+          <a:lnRef idx="2">
+            <a:schemeClr val="accent1">
+              <a:shade val="50000"/>
+            </a:schemeClr>
+          </a:lnRef>
+          <a:fillRef idx="1">
+            <a:schemeClr val="accent1"/>
+          </a:fillRef>
+          <a:effectRef idx="0">
+            <a:schemeClr val="accent1"/>
+          </a:effectRef>
+          <a:fontRef idx="minor">
+            <a:schemeClr val="lt1"/>
+          </a:fontRef>
+        </p:style>
+        <p:txBody>
+          <a:bodyPr rtlCol="0" anchor="ctr"/>
+          <a:lstStyle/>
+          <a:p>
+            <a:pPr algn="ctr"/>
+            <a:endParaRPr lang="ko-KR" altLang="en-US"/>
           </a:p>
         </p:txBody>
       </p:sp>
     </p:spTree>
     <p:extLst>
       <p:ext uri="{BB962C8B-B14F-4D97-AF65-F5344CB8AC3E}">
-        <p14:creationId xmlns:p14="http://schemas.microsoft.com/office/powerpoint/2010/main" val="2941614742"/>
+        <p14:creationId xmlns:p14="http://schemas.microsoft.com/office/powerpoint/2010/main" val="1009727215"/>
       </p:ext>
     </p:extLst>
   </p:cSld>

</xml_diff>